<commit_message>
update pptx with current flow
</commit_message>
<xml_diff>
--- a/DataCraft ELT Kimball Modeling with Visual Metabase.pptx
+++ b/DataCraft ELT Kimball Modeling with Visual Metabase.pptx
@@ -7,7 +7,7 @@
   <p:sldIdLst>
     <p:sldId id="256" r:id="rId2"/>
     <p:sldId id="258" r:id="rId3"/>
-    <p:sldId id="263" r:id="rId4"/>
+    <p:sldId id="265" r:id="rId4"/>
     <p:sldId id="257" r:id="rId5"/>
     <p:sldId id="261" r:id="rId6"/>
     <p:sldId id="260" r:id="rId7"/>
@@ -111,6 +111,11 @@
       </a:defRPr>
     </a:lvl9pPr>
   </p:defaultTextStyle>
+  <p:extLst>
+    <p:ext uri="{EFAFB233-063F-42B5-8137-9DF3F51BA10A}">
+      <p15:sldGuideLst xmlns:p15="http://schemas.microsoft.com/office/powerpoint/2012/main"/>
+    </p:ext>
+  </p:extLst>
 </p:presentation>
 </file>
 
@@ -445,7 +450,7 @@
           <a:p>
             <a:fld id="{DB193B18-CD75-4B3D-8E66-D4A7CE7E24A8}" type="datetimeFigureOut">
               <a:rPr lang="en-US" smtClean="0"/>
-              <a:t>10/14/2023</a:t>
+              <a:t>10/16/2023</a:t>
             </a:fld>
             <a:endParaRPr lang="en-US"/>
           </a:p>
@@ -769,7 +774,7 @@
           <a:p>
             <a:fld id="{DB193B18-CD75-4B3D-8E66-D4A7CE7E24A8}" type="datetimeFigureOut">
               <a:rPr lang="en-US" smtClean="0"/>
-              <a:t>10/14/2023</a:t>
+              <a:t>10/16/2023</a:t>
             </a:fld>
             <a:endParaRPr lang="en-US"/>
           </a:p>
@@ -1017,7 +1022,7 @@
           <a:p>
             <a:fld id="{DB193B18-CD75-4B3D-8E66-D4A7CE7E24A8}" type="datetimeFigureOut">
               <a:rPr lang="en-US" smtClean="0"/>
-              <a:t>10/14/2023</a:t>
+              <a:t>10/16/2023</a:t>
             </a:fld>
             <a:endParaRPr lang="en-US"/>
           </a:p>
@@ -1356,7 +1361,7 @@
           <a:p>
             <a:fld id="{DB193B18-CD75-4B3D-8E66-D4A7CE7E24A8}" type="datetimeFigureOut">
               <a:rPr lang="en-US" smtClean="0"/>
-              <a:t>10/14/2023</a:t>
+              <a:t>10/16/2023</a:t>
             </a:fld>
             <a:endParaRPr lang="en-US"/>
           </a:p>
@@ -1703,7 +1708,7 @@
           <a:p>
             <a:fld id="{DB193B18-CD75-4B3D-8E66-D4A7CE7E24A8}" type="datetimeFigureOut">
               <a:rPr lang="en-US" smtClean="0"/>
-              <a:t>10/14/2023</a:t>
+              <a:t>10/16/2023</a:t>
             </a:fld>
             <a:endParaRPr lang="en-US"/>
           </a:p>
@@ -2077,7 +2082,7 @@
           <a:p>
             <a:fld id="{DB193B18-CD75-4B3D-8E66-D4A7CE7E24A8}" type="datetimeFigureOut">
               <a:rPr lang="en-US" smtClean="0"/>
-              <a:t>10/14/2023</a:t>
+              <a:t>10/16/2023</a:t>
             </a:fld>
             <a:endParaRPr lang="en-US"/>
           </a:p>
@@ -2547,7 +2552,7 @@
           <a:p>
             <a:fld id="{DB193B18-CD75-4B3D-8E66-D4A7CE7E24A8}" type="datetimeFigureOut">
               <a:rPr lang="en-US" smtClean="0"/>
-              <a:t>10/14/2023</a:t>
+              <a:t>10/16/2023</a:t>
             </a:fld>
             <a:endParaRPr lang="en-US"/>
           </a:p>
@@ -2752,7 +2757,7 @@
           <a:p>
             <a:fld id="{DB193B18-CD75-4B3D-8E66-D4A7CE7E24A8}" type="datetimeFigureOut">
               <a:rPr lang="en-US" smtClean="0"/>
-              <a:t>10/14/2023</a:t>
+              <a:t>10/16/2023</a:t>
             </a:fld>
             <a:endParaRPr lang="en-US"/>
           </a:p>
@@ -2963,7 +2968,7 @@
           <a:p>
             <a:fld id="{DB193B18-CD75-4B3D-8E66-D4A7CE7E24A8}" type="datetimeFigureOut">
               <a:rPr lang="en-US" smtClean="0"/>
-              <a:t>10/14/2023</a:t>
+              <a:t>10/16/2023</a:t>
             </a:fld>
             <a:endParaRPr lang="en-US"/>
           </a:p>
@@ -3195,7 +3200,7 @@
           <a:p>
             <a:fld id="{DB193B18-CD75-4B3D-8E66-D4A7CE7E24A8}" type="datetimeFigureOut">
               <a:rPr lang="en-US" smtClean="0"/>
-              <a:t>10/14/2023</a:t>
+              <a:t>10/16/2023</a:t>
             </a:fld>
             <a:endParaRPr lang="en-US"/>
           </a:p>
@@ -3443,7 +3448,7 @@
           <a:p>
             <a:fld id="{DB193B18-CD75-4B3D-8E66-D4A7CE7E24A8}" type="datetimeFigureOut">
               <a:rPr lang="en-US" smtClean="0"/>
-              <a:t>10/14/2023</a:t>
+              <a:t>10/16/2023</a:t>
             </a:fld>
             <a:endParaRPr lang="en-US"/>
           </a:p>
@@ -3741,7 +3746,7 @@
           <a:p>
             <a:fld id="{DB193B18-CD75-4B3D-8E66-D4A7CE7E24A8}" type="datetimeFigureOut">
               <a:rPr lang="en-US" smtClean="0"/>
-              <a:t>10/14/2023</a:t>
+              <a:t>10/16/2023</a:t>
             </a:fld>
             <a:endParaRPr lang="en-US"/>
           </a:p>
@@ -4135,7 +4140,7 @@
           <a:p>
             <a:fld id="{DB193B18-CD75-4B3D-8E66-D4A7CE7E24A8}" type="datetimeFigureOut">
               <a:rPr lang="en-US" smtClean="0"/>
-              <a:t>10/14/2023</a:t>
+              <a:t>10/16/2023</a:t>
             </a:fld>
             <a:endParaRPr lang="en-US"/>
           </a:p>
@@ -4284,7 +4289,7 @@
           <a:p>
             <a:fld id="{DB193B18-CD75-4B3D-8E66-D4A7CE7E24A8}" type="datetimeFigureOut">
               <a:rPr lang="en-US" smtClean="0"/>
-              <a:t>10/14/2023</a:t>
+              <a:t>10/16/2023</a:t>
             </a:fld>
             <a:endParaRPr lang="en-US"/>
           </a:p>
@@ -4410,7 +4415,7 @@
           <a:p>
             <a:fld id="{DB193B18-CD75-4B3D-8E66-D4A7CE7E24A8}" type="datetimeFigureOut">
               <a:rPr lang="en-US" smtClean="0"/>
-              <a:t>10/14/2023</a:t>
+              <a:t>10/16/2023</a:t>
             </a:fld>
             <a:endParaRPr lang="en-US"/>
           </a:p>
@@ -4665,7 +4670,7 @@
           <a:p>
             <a:fld id="{DB193B18-CD75-4B3D-8E66-D4A7CE7E24A8}" type="datetimeFigureOut">
               <a:rPr lang="en-US" smtClean="0"/>
-              <a:t>10/14/2023</a:t>
+              <a:t>10/16/2023</a:t>
             </a:fld>
             <a:endParaRPr lang="en-US"/>
           </a:p>
@@ -4980,7 +4985,7 @@
           <a:p>
             <a:fld id="{DB193B18-CD75-4B3D-8E66-D4A7CE7E24A8}" type="datetimeFigureOut">
               <a:rPr lang="en-US" smtClean="0"/>
-              <a:t>10/14/2023</a:t>
+              <a:t>10/16/2023</a:t>
             </a:fld>
             <a:endParaRPr lang="en-US"/>
           </a:p>
@@ -5331,7 +5336,7 @@
           <a:p>
             <a:fld id="{DB193B18-CD75-4B3D-8E66-D4A7CE7E24A8}" type="datetimeFigureOut">
               <a:rPr lang="en-US" smtClean="0"/>
-              <a:t>10/14/2023</a:t>
+              <a:t>10/16/2023</a:t>
             </a:fld>
             <a:endParaRPr lang="en-US"/>
           </a:p>
@@ -6058,7 +6063,6 @@
               <a:rPr lang="en-US" sz="5000" dirty="0"/>
               <a:t> :</a:t>
             </a:r>
-            <a:endParaRPr lang="en-US" sz="5000" dirty="0"/>
           </a:p>
         </p:txBody>
       </p:sp>
@@ -6099,9 +6103,129 @@
           <a:chExt cx="0" cy="0"/>
         </a:xfrm>
       </p:grpSpPr>
+      <p:sp>
+        <p:nvSpPr>
+          <p:cNvPr id="8" name="TextBox 7"/>
+          <p:cNvSpPr txBox="1"/>
+          <p:nvPr/>
+        </p:nvSpPr>
+        <p:spPr>
+          <a:xfrm>
+            <a:off x="4102503" y="641444"/>
+            <a:ext cx="4012830" cy="553998"/>
+          </a:xfrm>
+          <a:prstGeom prst="rect">
+            <a:avLst/>
+          </a:prstGeom>
+          <a:noFill/>
+        </p:spPr>
+        <p:txBody>
+          <a:bodyPr wrap="none" rtlCol="0">
+            <a:spAutoFit/>
+          </a:bodyPr>
+          <a:lstStyle/>
+          <a:p>
+            <a:r>
+              <a:rPr lang="en-US" sz="3000" dirty="0" smtClean="0">
+                <a:latin typeface="+mj-lt"/>
+              </a:rPr>
+              <a:t>Infrastructure of Pipeline</a:t>
+            </a:r>
+            <a:endParaRPr lang="en-US" sz="3000" dirty="0">
+              <a:latin typeface="+mj-lt"/>
+            </a:endParaRPr>
+          </a:p>
+        </p:txBody>
+      </p:sp>
+      <p:sp>
+        <p:nvSpPr>
+          <p:cNvPr id="9" name="TextBox 8"/>
+          <p:cNvSpPr txBox="1"/>
+          <p:nvPr/>
+        </p:nvSpPr>
+        <p:spPr>
+          <a:xfrm>
+            <a:off x="736439" y="4971321"/>
+            <a:ext cx="10837252" cy="1323439"/>
+          </a:xfrm>
+          <a:prstGeom prst="rect">
+            <a:avLst/>
+          </a:prstGeom>
+          <a:noFill/>
+        </p:spPr>
+        <p:txBody>
+          <a:bodyPr wrap="square" rtlCol="0">
+            <a:spAutoFit/>
+          </a:bodyPr>
+          <a:lstStyle/>
+          <a:p>
+            <a:r>
+              <a:rPr lang="en-US" sz="2000" dirty="0" smtClean="0"/>
+              <a:t>Raw data from </a:t>
+            </a:r>
+            <a:r>
+              <a:rPr lang="en-US" sz="2000" dirty="0"/>
+              <a:t>Faker </a:t>
+            </a:r>
+            <a:r>
+              <a:rPr lang="en-US" sz="2000" dirty="0" smtClean="0"/>
+              <a:t>mechanism </a:t>
+            </a:r>
+            <a:r>
+              <a:rPr lang="en-US" sz="2000" dirty="0" smtClean="0"/>
+              <a:t>is </a:t>
+            </a:r>
+            <a:r>
+              <a:rPr lang="en-US" sz="2000" dirty="0" smtClean="0"/>
+              <a:t>extracted by </a:t>
+            </a:r>
+            <a:r>
+              <a:rPr lang="en-US" sz="2000" dirty="0" err="1" smtClean="0"/>
+              <a:t>Polars</a:t>
+            </a:r>
+            <a:r>
+              <a:rPr lang="en-US" sz="2000" dirty="0" smtClean="0"/>
+              <a:t> in Airflow and then loaded into </a:t>
+            </a:r>
+            <a:r>
+              <a:rPr lang="en-US" sz="2000" dirty="0" err="1" smtClean="0"/>
+              <a:t>Postgres</a:t>
+            </a:r>
+            <a:r>
+              <a:rPr lang="en-US" sz="2000" dirty="0" smtClean="0"/>
+              <a:t>. then Airflow runs the SQL file containing the dim and fact creation. All status instances are sent to email with attachments, telegram and slack. After the dim and data </a:t>
+            </a:r>
+            <a:r>
+              <a:rPr lang="en-US" sz="2000" dirty="0" err="1" smtClean="0"/>
+              <a:t>data</a:t>
+            </a:r>
+            <a:r>
+              <a:rPr lang="en-US" sz="2000" dirty="0" smtClean="0"/>
+              <a:t> are created, the </a:t>
+            </a:r>
+            <a:r>
+              <a:rPr lang="en-US" sz="2000" dirty="0" err="1" smtClean="0"/>
+              <a:t>metabase</a:t>
+            </a:r>
+            <a:r>
+              <a:rPr lang="en-US" sz="2000" dirty="0" smtClean="0"/>
+              <a:t> reads </a:t>
+            </a:r>
+            <a:r>
+              <a:rPr lang="en-US" sz="2000" dirty="0" err="1" smtClean="0"/>
+              <a:t>Postgres</a:t>
+            </a:r>
+            <a:r>
+              <a:rPr lang="en-US" sz="2000" dirty="0" smtClean="0"/>
+              <a:t> for visualization.</a:t>
+            </a:r>
+            <a:endParaRPr lang="en-US" sz="2000" dirty="0"/>
+          </a:p>
+        </p:txBody>
+      </p:sp>
       <p:pic>
         <p:nvPicPr>
-          <p:cNvPr id="6" name="Content Placeholder 5"/>
+          <p:cNvPr id="13" name="Content Placeholder 12"/>
           <p:cNvPicPr>
             <a:picLocks noGrp="1" noChangeAspect="1"/>
           </p:cNvPicPr>
@@ -6123,115 +6247,11 @@
         </p:blipFill>
         <p:spPr>
           <a:xfrm>
-            <a:off x="913860" y="787731"/>
-            <a:ext cx="10390116" cy="4235588"/>
+            <a:off x="801753" y="1159739"/>
+            <a:ext cx="10641311" cy="3839183"/>
           </a:xfrm>
         </p:spPr>
       </p:pic>
-      <p:sp>
-        <p:nvSpPr>
-          <p:cNvPr id="8" name="TextBox 7"/>
-          <p:cNvSpPr txBox="1"/>
-          <p:nvPr/>
-        </p:nvSpPr>
-        <p:spPr>
-          <a:xfrm>
-            <a:off x="4102503" y="641444"/>
-            <a:ext cx="4012830" cy="553998"/>
-          </a:xfrm>
-          <a:prstGeom prst="rect">
-            <a:avLst/>
-          </a:prstGeom>
-          <a:noFill/>
-        </p:spPr>
-        <p:txBody>
-          <a:bodyPr wrap="none" rtlCol="0">
-            <a:spAutoFit/>
-          </a:bodyPr>
-          <a:lstStyle/>
-          <a:p>
-            <a:r>
-              <a:rPr lang="en-US" sz="3000" dirty="0" smtClean="0">
-                <a:latin typeface="+mj-lt"/>
-              </a:rPr>
-              <a:t>Infrastructure of Pipeline</a:t>
-            </a:r>
-            <a:endParaRPr lang="en-US" sz="3000" dirty="0">
-              <a:latin typeface="+mj-lt"/>
-            </a:endParaRPr>
-          </a:p>
-        </p:txBody>
-      </p:sp>
-      <p:sp>
-        <p:nvSpPr>
-          <p:cNvPr id="9" name="TextBox 8"/>
-          <p:cNvSpPr txBox="1"/>
-          <p:nvPr/>
-        </p:nvSpPr>
-        <p:spPr>
-          <a:xfrm>
-            <a:off x="736439" y="5115014"/>
-            <a:ext cx="10768623" cy="1015663"/>
-          </a:xfrm>
-          <a:prstGeom prst="rect">
-            <a:avLst/>
-          </a:prstGeom>
-          <a:noFill/>
-        </p:spPr>
-        <p:txBody>
-          <a:bodyPr wrap="square" rtlCol="0">
-            <a:spAutoFit/>
-          </a:bodyPr>
-          <a:lstStyle/>
-          <a:p>
-            <a:r>
-              <a:rPr lang="en-US" sz="2000" dirty="0" smtClean="0"/>
-              <a:t>Raw data from GCS is extracted by </a:t>
-            </a:r>
-            <a:r>
-              <a:rPr lang="en-US" sz="2000" dirty="0" err="1" smtClean="0"/>
-              <a:t>Polars</a:t>
-            </a:r>
-            <a:r>
-              <a:rPr lang="en-US" sz="2000" dirty="0" smtClean="0"/>
-              <a:t> in Airflow and then loaded into </a:t>
-            </a:r>
-            <a:r>
-              <a:rPr lang="en-US" sz="2000" dirty="0" err="1" smtClean="0"/>
-              <a:t>Postgres</a:t>
-            </a:r>
-            <a:r>
-              <a:rPr lang="en-US" sz="2000" dirty="0" smtClean="0"/>
-              <a:t>. then Airflow runs the SQL file containing the dim and fact creation. All status instances are sent to email with attachments, telegram and slack. After the dim and data </a:t>
-            </a:r>
-            <a:r>
-              <a:rPr lang="en-US" sz="2000" dirty="0" err="1" smtClean="0"/>
-              <a:t>data</a:t>
-            </a:r>
-            <a:r>
-              <a:rPr lang="en-US" sz="2000" dirty="0" smtClean="0"/>
-              <a:t> are created, the </a:t>
-            </a:r>
-            <a:r>
-              <a:rPr lang="en-US" sz="2000" dirty="0" err="1" smtClean="0"/>
-              <a:t>metabase</a:t>
-            </a:r>
-            <a:r>
-              <a:rPr lang="en-US" sz="2000" dirty="0" smtClean="0"/>
-              <a:t> reads </a:t>
-            </a:r>
-            <a:r>
-              <a:rPr lang="en-US" sz="2000" dirty="0" err="1" smtClean="0"/>
-              <a:t>Postgres</a:t>
-            </a:r>
-            <a:r>
-              <a:rPr lang="en-US" sz="2000" dirty="0" smtClean="0"/>
-              <a:t> for visualization.</a:t>
-            </a:r>
-            <a:endParaRPr lang="en-US" sz="2000" dirty="0"/>
-          </a:p>
-        </p:txBody>
-      </p:sp>
     </p:spTree>
     <p:extLst>
       <p:ext uri="{BB962C8B-B14F-4D97-AF65-F5344CB8AC3E}">
@@ -6279,12 +6299,7 @@
             <p:ph type="title"/>
           </p:nvPr>
         </p:nvSpPr>
-        <p:spPr>
-          <a:xfrm>
-            <a:off x="1050878" y="327037"/>
-            <a:ext cx="9601196" cy="1303867"/>
-          </a:xfrm>
-        </p:spPr>
+        <p:spPr/>
         <p:txBody>
           <a:bodyPr>
             <a:normAutofit/>
@@ -6292,10 +6307,10 @@
           <a:lstStyle/>
           <a:p>
             <a:r>
-              <a:rPr lang="en-US" sz="3000" dirty="0" smtClean="0"/>
-              <a:t>Raw Data in Google Cloud Storage</a:t>
-            </a:r>
-            <a:endParaRPr lang="en-US" sz="3000" dirty="0"/>
+              <a:rPr lang="en-US" sz="4000" dirty="0" smtClean="0"/>
+              <a:t>Data Flow</a:t>
+            </a:r>
+            <a:endParaRPr lang="en-US" sz="4000" dirty="0"/>
           </a:p>
         </p:txBody>
       </p:sp>
@@ -6309,68 +6324,35 @@
             <p:ph idx="1"/>
           </p:nvPr>
         </p:nvPicPr>
-        <p:blipFill rotWithShape="1">
-          <a:blip r:embed="rId2"/>
-          <a:srcRect r="343"/>
-          <a:stretch/>
+        <p:blipFill>
+          <a:blip r:embed="rId2">
+            <a:extLst>
+              <a:ext uri="{28A0092B-C50C-407E-A947-70E740481C1C}">
+                <a14:useLocalDpi xmlns:a14="http://schemas.microsoft.com/office/drawing/2010/main" val="0"/>
+              </a:ext>
+            </a:extLst>
+          </a:blip>
+          <a:stretch>
+            <a:fillRect/>
+          </a:stretch>
         </p:blipFill>
         <p:spPr>
           <a:xfrm>
-            <a:off x="1050878" y="1630904"/>
-            <a:ext cx="10140291" cy="3194768"/>
-          </a:xfrm>
-          <a:prstGeom prst="rect">
-            <a:avLst/>
-          </a:prstGeom>
+            <a:off x="955767" y="2997894"/>
+            <a:ext cx="10336123" cy="907902"/>
+          </a:xfrm>
         </p:spPr>
       </p:pic>
-      <p:sp>
-        <p:nvSpPr>
-          <p:cNvPr id="6" name="TextBox 5"/>
-          <p:cNvSpPr txBox="1"/>
-          <p:nvPr/>
-        </p:nvSpPr>
-        <p:spPr>
-          <a:xfrm>
-            <a:off x="1050878" y="5101736"/>
-            <a:ext cx="7786299" cy="400110"/>
-          </a:xfrm>
-          <a:prstGeom prst="rect">
-            <a:avLst/>
-          </a:prstGeom>
-          <a:noFill/>
-        </p:spPr>
-        <p:txBody>
-          <a:bodyPr wrap="none" rtlCol="0">
-            <a:spAutoFit/>
-          </a:bodyPr>
-          <a:lstStyle/>
-          <a:p>
-            <a:r>
-              <a:rPr lang="en-US" sz="2000" dirty="0" smtClean="0"/>
-              <a:t>Raw data in Google Cloud Storage is in the format of CSV and Parquet files.</a:t>
-            </a:r>
-            <a:endParaRPr lang="en-US" sz="2000" dirty="0"/>
-          </a:p>
-        </p:txBody>
-      </p:sp>
     </p:spTree>
     <p:extLst>
       <p:ext uri="{BB962C8B-B14F-4D97-AF65-F5344CB8AC3E}">
-        <p14:creationId xmlns:p14="http://schemas.microsoft.com/office/powerpoint/2010/main" val="2165902780"/>
+        <p14:creationId xmlns:p14="http://schemas.microsoft.com/office/powerpoint/2010/main" val="3503907986"/>
       </p:ext>
     </p:extLst>
   </p:cSld>
   <p:clrMapOvr>
     <a:masterClrMapping/>
   </p:clrMapOvr>
-  <p:timing>
-    <p:tnLst>
-      <p:par>
-        <p:cTn id="1" dur="indefinite" restart="never" nodeType="tmRoot"/>
-      </p:par>
-    </p:tnLst>
-  </p:timing>
 </p:sld>
 </file>
 

</xml_diff>

<commit_message>
add screenshot updated ERD
</commit_message>
<xml_diff>
--- a/DataCraft ELT Kimball Modeling with Visual Metabase.pptx
+++ b/DataCraft ELT Kimball Modeling with Visual Metabase.pptx
@@ -450,7 +450,7 @@
           <a:p>
             <a:fld id="{DB193B18-CD75-4B3D-8E66-D4A7CE7E24A8}" type="datetimeFigureOut">
               <a:rPr lang="en-US" smtClean="0"/>
-              <a:t>10/21/2023</a:t>
+              <a:t>10/23/2023</a:t>
             </a:fld>
             <a:endParaRPr lang="en-US"/>
           </a:p>
@@ -774,7 +774,7 @@
           <a:p>
             <a:fld id="{DB193B18-CD75-4B3D-8E66-D4A7CE7E24A8}" type="datetimeFigureOut">
               <a:rPr lang="en-US" smtClean="0"/>
-              <a:t>10/21/2023</a:t>
+              <a:t>10/23/2023</a:t>
             </a:fld>
             <a:endParaRPr lang="en-US"/>
           </a:p>
@@ -1022,7 +1022,7 @@
           <a:p>
             <a:fld id="{DB193B18-CD75-4B3D-8E66-D4A7CE7E24A8}" type="datetimeFigureOut">
               <a:rPr lang="en-US" smtClean="0"/>
-              <a:t>10/21/2023</a:t>
+              <a:t>10/23/2023</a:t>
             </a:fld>
             <a:endParaRPr lang="en-US"/>
           </a:p>
@@ -1361,7 +1361,7 @@
           <a:p>
             <a:fld id="{DB193B18-CD75-4B3D-8E66-D4A7CE7E24A8}" type="datetimeFigureOut">
               <a:rPr lang="en-US" smtClean="0"/>
-              <a:t>10/21/2023</a:t>
+              <a:t>10/23/2023</a:t>
             </a:fld>
             <a:endParaRPr lang="en-US"/>
           </a:p>
@@ -1708,7 +1708,7 @@
           <a:p>
             <a:fld id="{DB193B18-CD75-4B3D-8E66-D4A7CE7E24A8}" type="datetimeFigureOut">
               <a:rPr lang="en-US" smtClean="0"/>
-              <a:t>10/21/2023</a:t>
+              <a:t>10/23/2023</a:t>
             </a:fld>
             <a:endParaRPr lang="en-US"/>
           </a:p>
@@ -2082,7 +2082,7 @@
           <a:p>
             <a:fld id="{DB193B18-CD75-4B3D-8E66-D4A7CE7E24A8}" type="datetimeFigureOut">
               <a:rPr lang="en-US" smtClean="0"/>
-              <a:t>10/21/2023</a:t>
+              <a:t>10/23/2023</a:t>
             </a:fld>
             <a:endParaRPr lang="en-US"/>
           </a:p>
@@ -2552,7 +2552,7 @@
           <a:p>
             <a:fld id="{DB193B18-CD75-4B3D-8E66-D4A7CE7E24A8}" type="datetimeFigureOut">
               <a:rPr lang="en-US" smtClean="0"/>
-              <a:t>10/21/2023</a:t>
+              <a:t>10/23/2023</a:t>
             </a:fld>
             <a:endParaRPr lang="en-US"/>
           </a:p>
@@ -2757,7 +2757,7 @@
           <a:p>
             <a:fld id="{DB193B18-CD75-4B3D-8E66-D4A7CE7E24A8}" type="datetimeFigureOut">
               <a:rPr lang="en-US" smtClean="0"/>
-              <a:t>10/21/2023</a:t>
+              <a:t>10/23/2023</a:t>
             </a:fld>
             <a:endParaRPr lang="en-US"/>
           </a:p>
@@ -2968,7 +2968,7 @@
           <a:p>
             <a:fld id="{DB193B18-CD75-4B3D-8E66-D4A7CE7E24A8}" type="datetimeFigureOut">
               <a:rPr lang="en-US" smtClean="0"/>
-              <a:t>10/21/2023</a:t>
+              <a:t>10/23/2023</a:t>
             </a:fld>
             <a:endParaRPr lang="en-US"/>
           </a:p>
@@ -3200,7 +3200,7 @@
           <a:p>
             <a:fld id="{DB193B18-CD75-4B3D-8E66-D4A7CE7E24A8}" type="datetimeFigureOut">
               <a:rPr lang="en-US" smtClean="0"/>
-              <a:t>10/21/2023</a:t>
+              <a:t>10/23/2023</a:t>
             </a:fld>
             <a:endParaRPr lang="en-US"/>
           </a:p>
@@ -3448,7 +3448,7 @@
           <a:p>
             <a:fld id="{DB193B18-CD75-4B3D-8E66-D4A7CE7E24A8}" type="datetimeFigureOut">
               <a:rPr lang="en-US" smtClean="0"/>
-              <a:t>10/21/2023</a:t>
+              <a:t>10/23/2023</a:t>
             </a:fld>
             <a:endParaRPr lang="en-US"/>
           </a:p>
@@ -3746,7 +3746,7 @@
           <a:p>
             <a:fld id="{DB193B18-CD75-4B3D-8E66-D4A7CE7E24A8}" type="datetimeFigureOut">
               <a:rPr lang="en-US" smtClean="0"/>
-              <a:t>10/21/2023</a:t>
+              <a:t>10/23/2023</a:t>
             </a:fld>
             <a:endParaRPr lang="en-US"/>
           </a:p>
@@ -4140,7 +4140,7 @@
           <a:p>
             <a:fld id="{DB193B18-CD75-4B3D-8E66-D4A7CE7E24A8}" type="datetimeFigureOut">
               <a:rPr lang="en-US" smtClean="0"/>
-              <a:t>10/21/2023</a:t>
+              <a:t>10/23/2023</a:t>
             </a:fld>
             <a:endParaRPr lang="en-US"/>
           </a:p>
@@ -4289,7 +4289,7 @@
           <a:p>
             <a:fld id="{DB193B18-CD75-4B3D-8E66-D4A7CE7E24A8}" type="datetimeFigureOut">
               <a:rPr lang="en-US" smtClean="0"/>
-              <a:t>10/21/2023</a:t>
+              <a:t>10/23/2023</a:t>
             </a:fld>
             <a:endParaRPr lang="en-US"/>
           </a:p>
@@ -4415,7 +4415,7 @@
           <a:p>
             <a:fld id="{DB193B18-CD75-4B3D-8E66-D4A7CE7E24A8}" type="datetimeFigureOut">
               <a:rPr lang="en-US" smtClean="0"/>
-              <a:t>10/21/2023</a:t>
+              <a:t>10/23/2023</a:t>
             </a:fld>
             <a:endParaRPr lang="en-US"/>
           </a:p>
@@ -4670,7 +4670,7 @@
           <a:p>
             <a:fld id="{DB193B18-CD75-4B3D-8E66-D4A7CE7E24A8}" type="datetimeFigureOut">
               <a:rPr lang="en-US" smtClean="0"/>
-              <a:t>10/21/2023</a:t>
+              <a:t>10/23/2023</a:t>
             </a:fld>
             <a:endParaRPr lang="en-US"/>
           </a:p>
@@ -4985,7 +4985,7 @@
           <a:p>
             <a:fld id="{DB193B18-CD75-4B3D-8E66-D4A7CE7E24A8}" type="datetimeFigureOut">
               <a:rPr lang="en-US" smtClean="0"/>
-              <a:t>10/21/2023</a:t>
+              <a:t>10/23/2023</a:t>
             </a:fld>
             <a:endParaRPr lang="en-US"/>
           </a:p>
@@ -5336,7 +5336,7 @@
           <a:p>
             <a:fld id="{DB193B18-CD75-4B3D-8E66-D4A7CE7E24A8}" type="datetimeFigureOut">
               <a:rPr lang="en-US" smtClean="0"/>
-              <a:t>10/21/2023</a:t>
+              <a:t>10/23/2023</a:t>
             </a:fld>
             <a:endParaRPr lang="en-US"/>
           </a:p>
@@ -6887,11 +6887,11 @@
   <p:clrMapOvr>
     <a:masterClrMapping/>
   </p:clrMapOvr>
-  <mc:AlternateContent xmlns:mc="http://schemas.openxmlformats.org/markup-compatibility/2006">
-    <mc:Choice xmlns:p14="http://schemas.microsoft.com/office/powerpoint/2010/main" Requires="p14">
+  <mc:AlternateContent xmlns:mc="http://schemas.openxmlformats.org/markup-compatibility/2006" xmlns:p14="http://schemas.microsoft.com/office/powerpoint/2010/main">
+    <mc:Choice Requires="p14">
       <p:transition spd="slow" p14:dur="2000"/>
     </mc:Choice>
-    <mc:Fallback>
+    <mc:Fallback xmlns="">
       <p:transition spd="slow"/>
     </mc:Fallback>
   </mc:AlternateContent>
@@ -7071,9 +7071,73 @@
           <a:chExt cx="0" cy="0"/>
         </a:xfrm>
       </p:grpSpPr>
+      <p:sp>
+        <p:nvSpPr>
+          <p:cNvPr id="5" name="TextBox 4"/>
+          <p:cNvSpPr txBox="1"/>
+          <p:nvPr/>
+        </p:nvSpPr>
+        <p:spPr>
+          <a:xfrm>
+            <a:off x="1333880" y="1368567"/>
+            <a:ext cx="3111689" cy="1015663"/>
+          </a:xfrm>
+          <a:prstGeom prst="rect">
+            <a:avLst/>
+          </a:prstGeom>
+          <a:noFill/>
+        </p:spPr>
+        <p:txBody>
+          <a:bodyPr wrap="square" rtlCol="0">
+            <a:spAutoFit/>
+          </a:bodyPr>
+          <a:lstStyle/>
+          <a:p>
+            <a:r>
+              <a:rPr lang="en-US" sz="3000" dirty="0" smtClean="0">
+                <a:latin typeface="+mj-lt"/>
+              </a:rPr>
+              <a:t>Entity Relationship Diagram (ERD)</a:t>
+            </a:r>
+            <a:endParaRPr lang="en-US" sz="3000" dirty="0">
+              <a:latin typeface="+mj-lt"/>
+            </a:endParaRPr>
+          </a:p>
+        </p:txBody>
+      </p:sp>
+      <p:sp>
+        <p:nvSpPr>
+          <p:cNvPr id="6" name="TextBox 5"/>
+          <p:cNvSpPr txBox="1"/>
+          <p:nvPr/>
+        </p:nvSpPr>
+        <p:spPr>
+          <a:xfrm>
+            <a:off x="1333880" y="2524836"/>
+            <a:ext cx="2583027" cy="707886"/>
+          </a:xfrm>
+          <a:prstGeom prst="rect">
+            <a:avLst/>
+          </a:prstGeom>
+          <a:noFill/>
+        </p:spPr>
+        <p:txBody>
+          <a:bodyPr wrap="square" rtlCol="0">
+            <a:spAutoFit/>
+          </a:bodyPr>
+          <a:lstStyle/>
+          <a:p>
+            <a:r>
+              <a:rPr lang="en-US" sz="2000" dirty="0" smtClean="0"/>
+              <a:t>relations from dim and fact tables</a:t>
+            </a:r>
+            <a:endParaRPr lang="en-US" sz="2000" dirty="0"/>
+          </a:p>
+        </p:txBody>
+      </p:sp>
       <p:pic>
         <p:nvPicPr>
-          <p:cNvPr id="4" name="Content Placeholder 3"/>
+          <p:cNvPr id="3" name="Content Placeholder 2"/>
           <p:cNvPicPr>
             <a:picLocks noGrp="1" noChangeAspect="1"/>
           </p:cNvPicPr>
@@ -7082,7 +7146,7 @@
           </p:nvPr>
         </p:nvPicPr>
         <p:blipFill>
-          <a:blip r:embed="rId2">
+          <a:blip r:embed="rId2" cstate="print">
             <a:extLst>
               <a:ext uri="{28A0092B-C50C-407E-A947-70E740481C1C}">
                 <a14:useLocalDpi xmlns:a14="http://schemas.microsoft.com/office/drawing/2010/main" val="0"/>
@@ -7095,75 +7159,24 @@
         </p:blipFill>
         <p:spPr>
           <a:xfrm>
-            <a:off x="4958613" y="660400"/>
-            <a:ext cx="6142040" cy="5549900"/>
-          </a:xfrm>
-        </p:spPr>
-      </p:pic>
-      <p:sp>
-        <p:nvSpPr>
-          <p:cNvPr id="5" name="TextBox 4"/>
-          <p:cNvSpPr txBox="1"/>
-          <p:nvPr/>
-        </p:nvSpPr>
-        <p:spPr>
-          <a:xfrm>
-            <a:off x="1333880" y="1368567"/>
-            <a:ext cx="3111689" cy="1015663"/>
+            <a:off x="6048104" y="138863"/>
+            <a:ext cx="4754879" cy="6626773"/>
           </a:xfrm>
           <a:prstGeom prst="rect">
             <a:avLst/>
           </a:prstGeom>
-          <a:noFill/>
-        </p:spPr>
-        <p:txBody>
-          <a:bodyPr wrap="square" rtlCol="0">
-            <a:spAutoFit/>
-          </a:bodyPr>
-          <a:lstStyle/>
-          <a:p>
-            <a:r>
-              <a:rPr lang="en-US" sz="3000" dirty="0" smtClean="0">
-                <a:latin typeface="+mj-lt"/>
-              </a:rPr>
-              <a:t>Entity Relationship Diagram (ERD)</a:t>
-            </a:r>
-            <a:endParaRPr lang="en-US" sz="3000" dirty="0">
-              <a:latin typeface="+mj-lt"/>
-            </a:endParaRPr>
-          </a:p>
-        </p:txBody>
-      </p:sp>
-      <p:sp>
-        <p:nvSpPr>
-          <p:cNvPr id="6" name="TextBox 5"/>
-          <p:cNvSpPr txBox="1"/>
-          <p:nvPr/>
-        </p:nvSpPr>
-        <p:spPr>
-          <a:xfrm>
-            <a:off x="1333880" y="2524836"/>
-            <a:ext cx="2583027" cy="707886"/>
-          </a:xfrm>
-          <a:prstGeom prst="rect">
-            <a:avLst/>
-          </a:prstGeom>
-          <a:noFill/>
-        </p:spPr>
-        <p:txBody>
-          <a:bodyPr wrap="square" rtlCol="0">
-            <a:spAutoFit/>
-          </a:bodyPr>
-          <a:lstStyle/>
-          <a:p>
-            <a:r>
-              <a:rPr lang="en-US" sz="2000" dirty="0" smtClean="0"/>
-              <a:t>relations from dim and fact tables</a:t>
-            </a:r>
-            <a:endParaRPr lang="en-US" sz="2000" dirty="0"/>
-          </a:p>
-        </p:txBody>
-      </p:sp>
+          <a:ln>
+            <a:noFill/>
+          </a:ln>
+          <a:effectLst>
+            <a:outerShdw blurRad="292100" dist="139700" dir="2700000" algn="tl" rotWithShape="0">
+              <a:srgbClr val="333333">
+                <a:alpha val="65000"/>
+              </a:srgbClr>
+            </a:outerShdw>
+          </a:effectLst>
+        </p:spPr>
+      </p:pic>
     </p:spTree>
     <p:extLst>
       <p:ext uri="{BB962C8B-B14F-4D97-AF65-F5344CB8AC3E}">

</xml_diff>

<commit_message>
update text in pptx
</commit_message>
<xml_diff>
--- a/DataCraft ELT Kimball Modeling with Visual Metabase.pptx
+++ b/DataCraft ELT Kimball Modeling with Visual Metabase.pptx
@@ -451,7 +451,7 @@
           <a:p>
             <a:fld id="{DB193B18-CD75-4B3D-8E66-D4A7CE7E24A8}" type="datetimeFigureOut">
               <a:rPr lang="en-US" smtClean="0"/>
-              <a:t>10/24/2023</a:t>
+              <a:t>10/25/2023</a:t>
             </a:fld>
             <a:endParaRPr lang="en-US"/>
           </a:p>
@@ -775,7 +775,7 @@
           <a:p>
             <a:fld id="{DB193B18-CD75-4B3D-8E66-D4A7CE7E24A8}" type="datetimeFigureOut">
               <a:rPr lang="en-US" smtClean="0"/>
-              <a:t>10/24/2023</a:t>
+              <a:t>10/25/2023</a:t>
             </a:fld>
             <a:endParaRPr lang="en-US"/>
           </a:p>
@@ -1023,7 +1023,7 @@
           <a:p>
             <a:fld id="{DB193B18-CD75-4B3D-8E66-D4A7CE7E24A8}" type="datetimeFigureOut">
               <a:rPr lang="en-US" smtClean="0"/>
-              <a:t>10/24/2023</a:t>
+              <a:t>10/25/2023</a:t>
             </a:fld>
             <a:endParaRPr lang="en-US"/>
           </a:p>
@@ -1362,7 +1362,7 @@
           <a:p>
             <a:fld id="{DB193B18-CD75-4B3D-8E66-D4A7CE7E24A8}" type="datetimeFigureOut">
               <a:rPr lang="en-US" smtClean="0"/>
-              <a:t>10/24/2023</a:t>
+              <a:t>10/25/2023</a:t>
             </a:fld>
             <a:endParaRPr lang="en-US"/>
           </a:p>
@@ -1709,7 +1709,7 @@
           <a:p>
             <a:fld id="{DB193B18-CD75-4B3D-8E66-D4A7CE7E24A8}" type="datetimeFigureOut">
               <a:rPr lang="en-US" smtClean="0"/>
-              <a:t>10/24/2023</a:t>
+              <a:t>10/25/2023</a:t>
             </a:fld>
             <a:endParaRPr lang="en-US"/>
           </a:p>
@@ -2083,7 +2083,7 @@
           <a:p>
             <a:fld id="{DB193B18-CD75-4B3D-8E66-D4A7CE7E24A8}" type="datetimeFigureOut">
               <a:rPr lang="en-US" smtClean="0"/>
-              <a:t>10/24/2023</a:t>
+              <a:t>10/25/2023</a:t>
             </a:fld>
             <a:endParaRPr lang="en-US"/>
           </a:p>
@@ -2553,7 +2553,7 @@
           <a:p>
             <a:fld id="{DB193B18-CD75-4B3D-8E66-D4A7CE7E24A8}" type="datetimeFigureOut">
               <a:rPr lang="en-US" smtClean="0"/>
-              <a:t>10/24/2023</a:t>
+              <a:t>10/25/2023</a:t>
             </a:fld>
             <a:endParaRPr lang="en-US"/>
           </a:p>
@@ -2758,7 +2758,7 @@
           <a:p>
             <a:fld id="{DB193B18-CD75-4B3D-8E66-D4A7CE7E24A8}" type="datetimeFigureOut">
               <a:rPr lang="en-US" smtClean="0"/>
-              <a:t>10/24/2023</a:t>
+              <a:t>10/25/2023</a:t>
             </a:fld>
             <a:endParaRPr lang="en-US"/>
           </a:p>
@@ -2969,7 +2969,7 @@
           <a:p>
             <a:fld id="{DB193B18-CD75-4B3D-8E66-D4A7CE7E24A8}" type="datetimeFigureOut">
               <a:rPr lang="en-US" smtClean="0"/>
-              <a:t>10/24/2023</a:t>
+              <a:t>10/25/2023</a:t>
             </a:fld>
             <a:endParaRPr lang="en-US"/>
           </a:p>
@@ -3201,7 +3201,7 @@
           <a:p>
             <a:fld id="{DB193B18-CD75-4B3D-8E66-D4A7CE7E24A8}" type="datetimeFigureOut">
               <a:rPr lang="en-US" smtClean="0"/>
-              <a:t>10/24/2023</a:t>
+              <a:t>10/25/2023</a:t>
             </a:fld>
             <a:endParaRPr lang="en-US"/>
           </a:p>
@@ -3449,7 +3449,7 @@
           <a:p>
             <a:fld id="{DB193B18-CD75-4B3D-8E66-D4A7CE7E24A8}" type="datetimeFigureOut">
               <a:rPr lang="en-US" smtClean="0"/>
-              <a:t>10/24/2023</a:t>
+              <a:t>10/25/2023</a:t>
             </a:fld>
             <a:endParaRPr lang="en-US"/>
           </a:p>
@@ -3747,7 +3747,7 @@
           <a:p>
             <a:fld id="{DB193B18-CD75-4B3D-8E66-D4A7CE7E24A8}" type="datetimeFigureOut">
               <a:rPr lang="en-US" smtClean="0"/>
-              <a:t>10/24/2023</a:t>
+              <a:t>10/25/2023</a:t>
             </a:fld>
             <a:endParaRPr lang="en-US"/>
           </a:p>
@@ -4141,7 +4141,7 @@
           <a:p>
             <a:fld id="{DB193B18-CD75-4B3D-8E66-D4A7CE7E24A8}" type="datetimeFigureOut">
               <a:rPr lang="en-US" smtClean="0"/>
-              <a:t>10/24/2023</a:t>
+              <a:t>10/25/2023</a:t>
             </a:fld>
             <a:endParaRPr lang="en-US"/>
           </a:p>
@@ -4290,7 +4290,7 @@
           <a:p>
             <a:fld id="{DB193B18-CD75-4B3D-8E66-D4A7CE7E24A8}" type="datetimeFigureOut">
               <a:rPr lang="en-US" smtClean="0"/>
-              <a:t>10/24/2023</a:t>
+              <a:t>10/25/2023</a:t>
             </a:fld>
             <a:endParaRPr lang="en-US"/>
           </a:p>
@@ -4416,7 +4416,7 @@
           <a:p>
             <a:fld id="{DB193B18-CD75-4B3D-8E66-D4A7CE7E24A8}" type="datetimeFigureOut">
               <a:rPr lang="en-US" smtClean="0"/>
-              <a:t>10/24/2023</a:t>
+              <a:t>10/25/2023</a:t>
             </a:fld>
             <a:endParaRPr lang="en-US"/>
           </a:p>
@@ -4671,7 +4671,7 @@
           <a:p>
             <a:fld id="{DB193B18-CD75-4B3D-8E66-D4A7CE7E24A8}" type="datetimeFigureOut">
               <a:rPr lang="en-US" smtClean="0"/>
-              <a:t>10/24/2023</a:t>
+              <a:t>10/25/2023</a:t>
             </a:fld>
             <a:endParaRPr lang="en-US"/>
           </a:p>
@@ -4986,7 +4986,7 @@
           <a:p>
             <a:fld id="{DB193B18-CD75-4B3D-8E66-D4A7CE7E24A8}" type="datetimeFigureOut">
               <a:rPr lang="en-US" smtClean="0"/>
-              <a:t>10/24/2023</a:t>
+              <a:t>10/25/2023</a:t>
             </a:fld>
             <a:endParaRPr lang="en-US"/>
           </a:p>
@@ -5337,7 +5337,7 @@
           <a:p>
             <a:fld id="{DB193B18-CD75-4B3D-8E66-D4A7CE7E24A8}" type="datetimeFigureOut">
               <a:rPr lang="en-US" smtClean="0"/>
-              <a:t>10/24/2023</a:t>
+              <a:t>10/25/2023</a:t>
             </a:fld>
             <a:endParaRPr lang="en-US"/>
           </a:p>
@@ -6207,19 +6207,31 @@
             </a:r>
             <a:r>
               <a:rPr lang="en-US" sz="2000" dirty="0" smtClean="0"/>
-              <a:t> format</a:t>
+              <a:t> format, then </a:t>
+            </a:r>
+            <a:r>
+              <a:rPr lang="en-US" sz="2000" dirty="0" err="1" smtClean="0"/>
+              <a:t>PostgresOperator</a:t>
+            </a:r>
+            <a:r>
+              <a:rPr lang="en-US" sz="2000" dirty="0"/>
+              <a:t> </a:t>
             </a:r>
             <a:r>
               <a:rPr lang="en-US" sz="2000" dirty="0" smtClean="0"/>
-              <a:t>, then </a:t>
+              <a:t>with .</a:t>
             </a:r>
             <a:r>
               <a:rPr lang="en-US" sz="2000" dirty="0" err="1" smtClean="0"/>
-              <a:t>polars</a:t>
+              <a:t>sql</a:t>
             </a:r>
             <a:r>
               <a:rPr lang="en-US" sz="2000" dirty="0" smtClean="0"/>
-              <a:t> will write it to </a:t>
+              <a:t> </a:t>
+            </a:r>
+            <a:r>
+              <a:rPr lang="en-US" sz="2000" dirty="0" smtClean="0"/>
+              <a:t>write to </a:t>
             </a:r>
             <a:r>
               <a:rPr lang="en-US" sz="2000" dirty="0" err="1" smtClean="0"/>
@@ -6227,7 +6239,15 @@
             </a:r>
             <a:r>
               <a:rPr lang="en-US" sz="2000" dirty="0" smtClean="0"/>
-              <a:t>. after that, the airflow send </a:t>
+              <a:t>. after </a:t>
+            </a:r>
+            <a:r>
+              <a:rPr lang="en-US" sz="2000" dirty="0" smtClean="0"/>
+              <a:t>that airflow </a:t>
+            </a:r>
+            <a:r>
+              <a:rPr lang="en-US" sz="2000" dirty="0" smtClean="0"/>
+              <a:t>send </a:t>
             </a:r>
             <a:r>
               <a:rPr lang="en-US" sz="2000" dirty="0" err="1" smtClean="0"/>

</xml_diff>

<commit_message>
integration Data Hub system
</commit_message>
<xml_diff>
--- a/DataCraft ELT Kimball Modeling with Visual Metabase.pptx
+++ b/DataCraft ELT Kimball Modeling with Visual Metabase.pptx
@@ -10,10 +10,11 @@
     <p:sldId id="265" r:id="rId4"/>
     <p:sldId id="257" r:id="rId5"/>
     <p:sldId id="266" r:id="rId6"/>
-    <p:sldId id="261" r:id="rId7"/>
-    <p:sldId id="260" r:id="rId8"/>
-    <p:sldId id="262" r:id="rId9"/>
-    <p:sldId id="264" r:id="rId10"/>
+    <p:sldId id="267" r:id="rId7"/>
+    <p:sldId id="261" r:id="rId8"/>
+    <p:sldId id="260" r:id="rId9"/>
+    <p:sldId id="262" r:id="rId10"/>
+    <p:sldId id="264" r:id="rId11"/>
   </p:sldIdLst>
   <p:sldSz cx="12192000" cy="6858000"/>
   <p:notesSz cx="6858000" cy="9144000"/>
@@ -451,7 +452,7 @@
           <a:p>
             <a:fld id="{DB193B18-CD75-4B3D-8E66-D4A7CE7E24A8}" type="datetimeFigureOut">
               <a:rPr lang="en-US" smtClean="0"/>
-              <a:t>10/25/2023</a:t>
+              <a:t>10/26/2023</a:t>
             </a:fld>
             <a:endParaRPr lang="en-US"/>
           </a:p>
@@ -775,7 +776,7 @@
           <a:p>
             <a:fld id="{DB193B18-CD75-4B3D-8E66-D4A7CE7E24A8}" type="datetimeFigureOut">
               <a:rPr lang="en-US" smtClean="0"/>
-              <a:t>10/25/2023</a:t>
+              <a:t>10/26/2023</a:t>
             </a:fld>
             <a:endParaRPr lang="en-US"/>
           </a:p>
@@ -1023,7 +1024,7 @@
           <a:p>
             <a:fld id="{DB193B18-CD75-4B3D-8E66-D4A7CE7E24A8}" type="datetimeFigureOut">
               <a:rPr lang="en-US" smtClean="0"/>
-              <a:t>10/25/2023</a:t>
+              <a:t>10/26/2023</a:t>
             </a:fld>
             <a:endParaRPr lang="en-US"/>
           </a:p>
@@ -1362,7 +1363,7 @@
           <a:p>
             <a:fld id="{DB193B18-CD75-4B3D-8E66-D4A7CE7E24A8}" type="datetimeFigureOut">
               <a:rPr lang="en-US" smtClean="0"/>
-              <a:t>10/25/2023</a:t>
+              <a:t>10/26/2023</a:t>
             </a:fld>
             <a:endParaRPr lang="en-US"/>
           </a:p>
@@ -1709,7 +1710,7 @@
           <a:p>
             <a:fld id="{DB193B18-CD75-4B3D-8E66-D4A7CE7E24A8}" type="datetimeFigureOut">
               <a:rPr lang="en-US" smtClean="0"/>
-              <a:t>10/25/2023</a:t>
+              <a:t>10/26/2023</a:t>
             </a:fld>
             <a:endParaRPr lang="en-US"/>
           </a:p>
@@ -2083,7 +2084,7 @@
           <a:p>
             <a:fld id="{DB193B18-CD75-4B3D-8E66-D4A7CE7E24A8}" type="datetimeFigureOut">
               <a:rPr lang="en-US" smtClean="0"/>
-              <a:t>10/25/2023</a:t>
+              <a:t>10/26/2023</a:t>
             </a:fld>
             <a:endParaRPr lang="en-US"/>
           </a:p>
@@ -2553,7 +2554,7 @@
           <a:p>
             <a:fld id="{DB193B18-CD75-4B3D-8E66-D4A7CE7E24A8}" type="datetimeFigureOut">
               <a:rPr lang="en-US" smtClean="0"/>
-              <a:t>10/25/2023</a:t>
+              <a:t>10/26/2023</a:t>
             </a:fld>
             <a:endParaRPr lang="en-US"/>
           </a:p>
@@ -2758,7 +2759,7 @@
           <a:p>
             <a:fld id="{DB193B18-CD75-4B3D-8E66-D4A7CE7E24A8}" type="datetimeFigureOut">
               <a:rPr lang="en-US" smtClean="0"/>
-              <a:t>10/25/2023</a:t>
+              <a:t>10/26/2023</a:t>
             </a:fld>
             <a:endParaRPr lang="en-US"/>
           </a:p>
@@ -2969,7 +2970,7 @@
           <a:p>
             <a:fld id="{DB193B18-CD75-4B3D-8E66-D4A7CE7E24A8}" type="datetimeFigureOut">
               <a:rPr lang="en-US" smtClean="0"/>
-              <a:t>10/25/2023</a:t>
+              <a:t>10/26/2023</a:t>
             </a:fld>
             <a:endParaRPr lang="en-US"/>
           </a:p>
@@ -3201,7 +3202,7 @@
           <a:p>
             <a:fld id="{DB193B18-CD75-4B3D-8E66-D4A7CE7E24A8}" type="datetimeFigureOut">
               <a:rPr lang="en-US" smtClean="0"/>
-              <a:t>10/25/2023</a:t>
+              <a:t>10/26/2023</a:t>
             </a:fld>
             <a:endParaRPr lang="en-US"/>
           </a:p>
@@ -3449,7 +3450,7 @@
           <a:p>
             <a:fld id="{DB193B18-CD75-4B3D-8E66-D4A7CE7E24A8}" type="datetimeFigureOut">
               <a:rPr lang="en-US" smtClean="0"/>
-              <a:t>10/25/2023</a:t>
+              <a:t>10/26/2023</a:t>
             </a:fld>
             <a:endParaRPr lang="en-US"/>
           </a:p>
@@ -3747,7 +3748,7 @@
           <a:p>
             <a:fld id="{DB193B18-CD75-4B3D-8E66-D4A7CE7E24A8}" type="datetimeFigureOut">
               <a:rPr lang="en-US" smtClean="0"/>
-              <a:t>10/25/2023</a:t>
+              <a:t>10/26/2023</a:t>
             </a:fld>
             <a:endParaRPr lang="en-US"/>
           </a:p>
@@ -4141,7 +4142,7 @@
           <a:p>
             <a:fld id="{DB193B18-CD75-4B3D-8E66-D4A7CE7E24A8}" type="datetimeFigureOut">
               <a:rPr lang="en-US" smtClean="0"/>
-              <a:t>10/25/2023</a:t>
+              <a:t>10/26/2023</a:t>
             </a:fld>
             <a:endParaRPr lang="en-US"/>
           </a:p>
@@ -4290,7 +4291,7 @@
           <a:p>
             <a:fld id="{DB193B18-CD75-4B3D-8E66-D4A7CE7E24A8}" type="datetimeFigureOut">
               <a:rPr lang="en-US" smtClean="0"/>
-              <a:t>10/25/2023</a:t>
+              <a:t>10/26/2023</a:t>
             </a:fld>
             <a:endParaRPr lang="en-US"/>
           </a:p>
@@ -4416,7 +4417,7 @@
           <a:p>
             <a:fld id="{DB193B18-CD75-4B3D-8E66-D4A7CE7E24A8}" type="datetimeFigureOut">
               <a:rPr lang="en-US" smtClean="0"/>
-              <a:t>10/25/2023</a:t>
+              <a:t>10/26/2023</a:t>
             </a:fld>
             <a:endParaRPr lang="en-US"/>
           </a:p>
@@ -4671,7 +4672,7 @@
           <a:p>
             <a:fld id="{DB193B18-CD75-4B3D-8E66-D4A7CE7E24A8}" type="datetimeFigureOut">
               <a:rPr lang="en-US" smtClean="0"/>
-              <a:t>10/25/2023</a:t>
+              <a:t>10/26/2023</a:t>
             </a:fld>
             <a:endParaRPr lang="en-US"/>
           </a:p>
@@ -4986,7 +4987,7 @@
           <a:p>
             <a:fld id="{DB193B18-CD75-4B3D-8E66-D4A7CE7E24A8}" type="datetimeFigureOut">
               <a:rPr lang="en-US" smtClean="0"/>
-              <a:t>10/25/2023</a:t>
+              <a:t>10/26/2023</a:t>
             </a:fld>
             <a:endParaRPr lang="en-US"/>
           </a:p>
@@ -5337,7 +5338,7 @@
           <a:p>
             <a:fld id="{DB193B18-CD75-4B3D-8E66-D4A7CE7E24A8}" type="datetimeFigureOut">
               <a:rPr lang="en-US" smtClean="0"/>
-              <a:t>10/25/2023</a:t>
+              <a:t>10/26/2023</a:t>
             </a:fld>
             <a:endParaRPr lang="en-US"/>
           </a:p>
@@ -6087,6 +6088,114 @@
 </p:sld>
 </file>
 
+<file path=ppt/slides/slide10.xml><?xml version="1.0" encoding="utf-8"?>
+<p:sld xmlns:a="http://schemas.openxmlformats.org/drawingml/2006/main" xmlns:r="http://schemas.openxmlformats.org/officeDocument/2006/relationships" xmlns:p="http://schemas.openxmlformats.org/presentationml/2006/main">
+  <p:cSld>
+    <p:spTree>
+      <p:nvGrpSpPr>
+        <p:cNvPr id="1" name=""/>
+        <p:cNvGrpSpPr/>
+        <p:nvPr/>
+      </p:nvGrpSpPr>
+      <p:grpSpPr>
+        <a:xfrm>
+          <a:off x="0" y="0"/>
+          <a:ext cx="0" cy="0"/>
+          <a:chOff x="0" y="0"/>
+          <a:chExt cx="0" cy="0"/>
+        </a:xfrm>
+      </p:grpSpPr>
+      <p:pic>
+        <p:nvPicPr>
+          <p:cNvPr id="5" name="Picture 4"/>
+          <p:cNvPicPr>
+            <a:picLocks noChangeAspect="1"/>
+          </p:cNvPicPr>
+          <p:nvPr/>
+        </p:nvPicPr>
+        <p:blipFill>
+          <a:blip r:embed="rId2"/>
+          <a:stretch>
+            <a:fillRect/>
+          </a:stretch>
+        </p:blipFill>
+        <p:spPr>
+          <a:xfrm>
+            <a:off x="559558" y="638869"/>
+            <a:ext cx="11058261" cy="5604871"/>
+          </a:xfrm>
+          <a:prstGeom prst="rect">
+            <a:avLst/>
+          </a:prstGeom>
+        </p:spPr>
+      </p:pic>
+      <p:sp>
+        <p:nvSpPr>
+          <p:cNvPr id="6" name="TextBox 5"/>
+          <p:cNvSpPr txBox="1"/>
+          <p:nvPr/>
+        </p:nvSpPr>
+        <p:spPr>
+          <a:xfrm>
+            <a:off x="9048464" y="707109"/>
+            <a:ext cx="2359685" cy="369332"/>
+          </a:xfrm>
+          <a:prstGeom prst="rect">
+            <a:avLst/>
+          </a:prstGeom>
+        </p:spPr>
+        <p:style>
+          <a:lnRef idx="2">
+            <a:schemeClr val="dk1"/>
+          </a:lnRef>
+          <a:fillRef idx="1">
+            <a:schemeClr val="lt1"/>
+          </a:fillRef>
+          <a:effectRef idx="0">
+            <a:schemeClr val="dk1"/>
+          </a:effectRef>
+          <a:fontRef idx="minor">
+            <a:schemeClr val="dk1"/>
+          </a:fontRef>
+        </p:style>
+        <p:txBody>
+          <a:bodyPr wrap="none" rtlCol="0">
+            <a:spAutoFit/>
+          </a:bodyPr>
+          <a:lstStyle/>
+          <a:p>
+            <a:r>
+              <a:rPr lang="en-US" dirty="0" smtClean="0"/>
+              <a:t>Dashboard of </a:t>
+            </a:r>
+            <a:r>
+              <a:rPr lang="en-US" dirty="0" err="1" smtClean="0"/>
+              <a:t>Metabase</a:t>
+            </a:r>
+            <a:endParaRPr lang="en-US" dirty="0"/>
+          </a:p>
+        </p:txBody>
+      </p:sp>
+    </p:spTree>
+    <p:extLst>
+      <p:ext uri="{BB962C8B-B14F-4D97-AF65-F5344CB8AC3E}">
+        <p14:creationId xmlns:p14="http://schemas.microsoft.com/office/powerpoint/2010/main" val="2719907903"/>
+      </p:ext>
+    </p:extLst>
+  </p:cSld>
+  <p:clrMapOvr>
+    <a:masterClrMapping/>
+  </p:clrMapOvr>
+  <p:timing>
+    <p:tnLst>
+      <p:par>
+        <p:cTn id="1" dur="indefinite" restart="never" nodeType="tmRoot"/>
+      </p:par>
+    </p:tnLst>
+  </p:timing>
+</p:sld>
+</file>
+
 <file path=ppt/slides/slide2.xml><?xml version="1.0" encoding="utf-8"?>
 <p:sld xmlns:a="http://schemas.openxmlformats.org/drawingml/2006/main" xmlns:r="http://schemas.openxmlformats.org/officeDocument/2006/relationships" xmlns:p="http://schemas.openxmlformats.org/presentationml/2006/main">
   <p:cSld>
@@ -6106,7 +6215,7 @@
       </p:grpSpPr>
       <p:pic>
         <p:nvPicPr>
-          <p:cNvPr id="4" name="Content Placeholder 3"/>
+          <p:cNvPr id="3" name="Content Placeholder 2"/>
           <p:cNvPicPr>
             <a:picLocks noGrp="1" noChangeAspect="1"/>
           </p:cNvPicPr>
@@ -6128,8 +6237,8 @@
         </p:blipFill>
         <p:spPr>
           <a:xfrm>
-            <a:off x="1026159" y="759009"/>
-            <a:ext cx="10173250" cy="4531448"/>
+            <a:off x="1415705" y="760815"/>
+            <a:ext cx="9413403" cy="4563234"/>
           </a:xfrm>
         </p:spPr>
       </p:pic>
@@ -6227,11 +6336,7 @@
             </a:r>
             <a:r>
               <a:rPr lang="en-US" sz="2000" dirty="0" smtClean="0"/>
-              <a:t> </a:t>
-            </a:r>
-            <a:r>
-              <a:rPr lang="en-US" sz="2000" dirty="0" smtClean="0"/>
-              <a:t>write to </a:t>
+              <a:t> write to </a:t>
             </a:r>
             <a:r>
               <a:rPr lang="en-US" sz="2000" dirty="0" err="1" smtClean="0"/>
@@ -6239,15 +6344,7 @@
             </a:r>
             <a:r>
               <a:rPr lang="en-US" sz="2000" dirty="0" smtClean="0"/>
-              <a:t>. after </a:t>
-            </a:r>
-            <a:r>
-              <a:rPr lang="en-US" sz="2000" dirty="0" smtClean="0"/>
-              <a:t>that airflow </a:t>
-            </a:r>
-            <a:r>
-              <a:rPr lang="en-US" sz="2000" dirty="0" smtClean="0"/>
-              <a:t>send </a:t>
+              <a:t>. after that airflow send </a:t>
             </a:r>
             <a:r>
               <a:rPr lang="en-US" sz="2000" dirty="0" err="1" smtClean="0"/>
@@ -7627,7 +7724,7 @@
         </p:nvSpPr>
         <p:spPr>
           <a:xfrm>
-            <a:off x="1240811" y="449870"/>
+            <a:off x="1295402" y="456760"/>
             <a:ext cx="9601196" cy="1303867"/>
           </a:xfrm>
         </p:spPr>
@@ -7639,7 +7736,7 @@
           <a:p>
             <a:r>
               <a:rPr lang="en-US" sz="3000" dirty="0" smtClean="0"/>
-              <a:t>Email Notifications</a:t>
+              <a:t>Data Hub</a:t>
             </a:r>
             <a:endParaRPr lang="en-US" sz="3000" dirty="0"/>
           </a:p>
@@ -7647,7 +7744,7 @@
       </p:sp>
       <p:pic>
         <p:nvPicPr>
-          <p:cNvPr id="4" name="Content Placeholder 7"/>
+          <p:cNvPr id="4" name="Content Placeholder 3"/>
           <p:cNvPicPr>
             <a:picLocks noGrp="1" noChangeAspect="1"/>
           </p:cNvPicPr>
@@ -7656,28 +7753,25 @@
           </p:nvPr>
         </p:nvPicPr>
         <p:blipFill>
-          <a:blip r:embed="rId2">
-            <a:extLst>
-              <a:ext uri="{28A0092B-C50C-407E-A947-70E740481C1C}">
-                <a14:useLocalDpi xmlns:a14="http://schemas.microsoft.com/office/drawing/2010/main" val="0"/>
-              </a:ext>
-            </a:extLst>
-          </a:blip>
+          <a:blip r:embed="rId2"/>
           <a:stretch>
             <a:fillRect/>
           </a:stretch>
         </p:blipFill>
         <p:spPr>
           <a:xfrm>
-            <a:off x="1111208" y="1601788"/>
-            <a:ext cx="9961380" cy="4227512"/>
-          </a:xfrm>
+            <a:off x="2719253" y="1447119"/>
+            <a:ext cx="7258278" cy="4783866"/>
+          </a:xfrm>
+          <a:prstGeom prst="rect">
+            <a:avLst/>
+          </a:prstGeom>
         </p:spPr>
       </p:pic>
     </p:spTree>
     <p:extLst>
       <p:ext uri="{BB962C8B-B14F-4D97-AF65-F5344CB8AC3E}">
-        <p14:creationId xmlns:p14="http://schemas.microsoft.com/office/powerpoint/2010/main" val="1887938766"/>
+        <p14:creationId xmlns:p14="http://schemas.microsoft.com/office/powerpoint/2010/main" val="2103497539"/>
       </p:ext>
     </p:extLst>
   </p:cSld>
@@ -7723,6 +7817,102 @@
         </p:nvSpPr>
         <p:spPr>
           <a:xfrm>
+            <a:off x="1240811" y="449870"/>
+            <a:ext cx="9601196" cy="1303867"/>
+          </a:xfrm>
+        </p:spPr>
+        <p:txBody>
+          <a:bodyPr>
+            <a:normAutofit/>
+          </a:bodyPr>
+          <a:lstStyle/>
+          <a:p>
+            <a:r>
+              <a:rPr lang="en-US" sz="3000" dirty="0" smtClean="0"/>
+              <a:t>Email Notifications</a:t>
+            </a:r>
+            <a:endParaRPr lang="en-US" sz="3000" dirty="0"/>
+          </a:p>
+        </p:txBody>
+      </p:sp>
+      <p:pic>
+        <p:nvPicPr>
+          <p:cNvPr id="4" name="Content Placeholder 7"/>
+          <p:cNvPicPr>
+            <a:picLocks noGrp="1" noChangeAspect="1"/>
+          </p:cNvPicPr>
+          <p:nvPr>
+            <p:ph idx="1"/>
+          </p:nvPr>
+        </p:nvPicPr>
+        <p:blipFill>
+          <a:blip r:embed="rId2">
+            <a:extLst>
+              <a:ext uri="{28A0092B-C50C-407E-A947-70E740481C1C}">
+                <a14:useLocalDpi xmlns:a14="http://schemas.microsoft.com/office/drawing/2010/main" val="0"/>
+              </a:ext>
+            </a:extLst>
+          </a:blip>
+          <a:stretch>
+            <a:fillRect/>
+          </a:stretch>
+        </p:blipFill>
+        <p:spPr>
+          <a:xfrm>
+            <a:off x="1111208" y="1601788"/>
+            <a:ext cx="9961380" cy="4227512"/>
+          </a:xfrm>
+        </p:spPr>
+      </p:pic>
+    </p:spTree>
+    <p:extLst>
+      <p:ext uri="{BB962C8B-B14F-4D97-AF65-F5344CB8AC3E}">
+        <p14:creationId xmlns:p14="http://schemas.microsoft.com/office/powerpoint/2010/main" val="1887938766"/>
+      </p:ext>
+    </p:extLst>
+  </p:cSld>
+  <p:clrMapOvr>
+    <a:masterClrMapping/>
+  </p:clrMapOvr>
+  <p:timing>
+    <p:tnLst>
+      <p:par>
+        <p:cTn id="1" dur="indefinite" restart="never" nodeType="tmRoot"/>
+      </p:par>
+    </p:tnLst>
+  </p:timing>
+</p:sld>
+</file>
+
+<file path=ppt/slides/slide8.xml><?xml version="1.0" encoding="utf-8"?>
+<p:sld xmlns:a="http://schemas.openxmlformats.org/drawingml/2006/main" xmlns:r="http://schemas.openxmlformats.org/officeDocument/2006/relationships" xmlns:p="http://schemas.openxmlformats.org/presentationml/2006/main">
+  <p:cSld>
+    <p:spTree>
+      <p:nvGrpSpPr>
+        <p:cNvPr id="1" name=""/>
+        <p:cNvGrpSpPr/>
+        <p:nvPr/>
+      </p:nvGrpSpPr>
+      <p:grpSpPr>
+        <a:xfrm>
+          <a:off x="0" y="0"/>
+          <a:ext cx="0" cy="0"/>
+          <a:chOff x="0" y="0"/>
+          <a:chExt cx="0" cy="0"/>
+        </a:xfrm>
+      </p:grpSpPr>
+      <p:sp>
+        <p:nvSpPr>
+          <p:cNvPr id="2" name="Title 1"/>
+          <p:cNvSpPr>
+            <a:spLocks noGrp="1"/>
+          </p:cNvSpPr>
+          <p:nvPr>
+            <p:ph type="title"/>
+          </p:nvPr>
+        </p:nvSpPr>
+        <p:spPr>
+          <a:xfrm>
             <a:off x="1284531" y="449868"/>
             <a:ext cx="9601196" cy="1303867"/>
           </a:xfrm>
@@ -7789,7 +7979,7 @@
 </p:sld>
 </file>
 
-<file path=ppt/slides/slide8.xml><?xml version="1.0" encoding="utf-8"?>
+<file path=ppt/slides/slide9.xml><?xml version="1.0" encoding="utf-8"?>
 <p:sld xmlns:a="http://schemas.openxmlformats.org/drawingml/2006/main" xmlns:r="http://schemas.openxmlformats.org/officeDocument/2006/relationships" xmlns:p="http://schemas.openxmlformats.org/presentationml/2006/main">
   <p:cSld>
     <p:spTree>
@@ -7966,114 +8156,6 @@
     <p:extLst>
       <p:ext uri="{BB962C8B-B14F-4D97-AF65-F5344CB8AC3E}">
         <p14:creationId xmlns:p14="http://schemas.microsoft.com/office/powerpoint/2010/main" val="672279880"/>
-      </p:ext>
-    </p:extLst>
-  </p:cSld>
-  <p:clrMapOvr>
-    <a:masterClrMapping/>
-  </p:clrMapOvr>
-  <p:timing>
-    <p:tnLst>
-      <p:par>
-        <p:cTn id="1" dur="indefinite" restart="never" nodeType="tmRoot"/>
-      </p:par>
-    </p:tnLst>
-  </p:timing>
-</p:sld>
-</file>
-
-<file path=ppt/slides/slide9.xml><?xml version="1.0" encoding="utf-8"?>
-<p:sld xmlns:a="http://schemas.openxmlformats.org/drawingml/2006/main" xmlns:r="http://schemas.openxmlformats.org/officeDocument/2006/relationships" xmlns:p="http://schemas.openxmlformats.org/presentationml/2006/main">
-  <p:cSld>
-    <p:spTree>
-      <p:nvGrpSpPr>
-        <p:cNvPr id="1" name=""/>
-        <p:cNvGrpSpPr/>
-        <p:nvPr/>
-      </p:nvGrpSpPr>
-      <p:grpSpPr>
-        <a:xfrm>
-          <a:off x="0" y="0"/>
-          <a:ext cx="0" cy="0"/>
-          <a:chOff x="0" y="0"/>
-          <a:chExt cx="0" cy="0"/>
-        </a:xfrm>
-      </p:grpSpPr>
-      <p:pic>
-        <p:nvPicPr>
-          <p:cNvPr id="5" name="Picture 4"/>
-          <p:cNvPicPr>
-            <a:picLocks noChangeAspect="1"/>
-          </p:cNvPicPr>
-          <p:nvPr/>
-        </p:nvPicPr>
-        <p:blipFill>
-          <a:blip r:embed="rId2"/>
-          <a:stretch>
-            <a:fillRect/>
-          </a:stretch>
-        </p:blipFill>
-        <p:spPr>
-          <a:xfrm>
-            <a:off x="559558" y="638869"/>
-            <a:ext cx="11058261" cy="5604871"/>
-          </a:xfrm>
-          <a:prstGeom prst="rect">
-            <a:avLst/>
-          </a:prstGeom>
-        </p:spPr>
-      </p:pic>
-      <p:sp>
-        <p:nvSpPr>
-          <p:cNvPr id="6" name="TextBox 5"/>
-          <p:cNvSpPr txBox="1"/>
-          <p:nvPr/>
-        </p:nvSpPr>
-        <p:spPr>
-          <a:xfrm>
-            <a:off x="9048464" y="707109"/>
-            <a:ext cx="2359685" cy="369332"/>
-          </a:xfrm>
-          <a:prstGeom prst="rect">
-            <a:avLst/>
-          </a:prstGeom>
-        </p:spPr>
-        <p:style>
-          <a:lnRef idx="2">
-            <a:schemeClr val="dk1"/>
-          </a:lnRef>
-          <a:fillRef idx="1">
-            <a:schemeClr val="lt1"/>
-          </a:fillRef>
-          <a:effectRef idx="0">
-            <a:schemeClr val="dk1"/>
-          </a:effectRef>
-          <a:fontRef idx="minor">
-            <a:schemeClr val="dk1"/>
-          </a:fontRef>
-        </p:style>
-        <p:txBody>
-          <a:bodyPr wrap="none" rtlCol="0">
-            <a:spAutoFit/>
-          </a:bodyPr>
-          <a:lstStyle/>
-          <a:p>
-            <a:r>
-              <a:rPr lang="en-US" dirty="0" smtClean="0"/>
-              <a:t>Dashboard of </a:t>
-            </a:r>
-            <a:r>
-              <a:rPr lang="en-US" dirty="0" err="1" smtClean="0"/>
-              <a:t>Metabase</a:t>
-            </a:r>
-            <a:endParaRPr lang="en-US" dirty="0"/>
-          </a:p>
-        </p:txBody>
-      </p:sp>
-    </p:spTree>
-    <p:extLst>
-      <p:ext uri="{BB962C8B-B14F-4D97-AF65-F5344CB8AC3E}">
-        <p14:creationId xmlns:p14="http://schemas.microsoft.com/office/powerpoint/2010/main" val="2719907903"/>
       </p:ext>
     </p:extLst>
   </p:cSld>

</xml_diff>

<commit_message>
integrate postgres and metabase to datahub
</commit_message>
<xml_diff>
--- a/DataCraft ELT Kimball Modeling with Visual Metabase.pptx
+++ b/DataCraft ELT Kimball Modeling with Visual Metabase.pptx
@@ -452,7 +452,7 @@
           <a:p>
             <a:fld id="{DB193B18-CD75-4B3D-8E66-D4A7CE7E24A8}" type="datetimeFigureOut">
               <a:rPr lang="en-US" smtClean="0"/>
-              <a:t>10/26/2023</a:t>
+              <a:t>10/27/2023</a:t>
             </a:fld>
             <a:endParaRPr lang="en-US"/>
           </a:p>
@@ -776,7 +776,7 @@
           <a:p>
             <a:fld id="{DB193B18-CD75-4B3D-8E66-D4A7CE7E24A8}" type="datetimeFigureOut">
               <a:rPr lang="en-US" smtClean="0"/>
-              <a:t>10/26/2023</a:t>
+              <a:t>10/27/2023</a:t>
             </a:fld>
             <a:endParaRPr lang="en-US"/>
           </a:p>
@@ -1024,7 +1024,7 @@
           <a:p>
             <a:fld id="{DB193B18-CD75-4B3D-8E66-D4A7CE7E24A8}" type="datetimeFigureOut">
               <a:rPr lang="en-US" smtClean="0"/>
-              <a:t>10/26/2023</a:t>
+              <a:t>10/27/2023</a:t>
             </a:fld>
             <a:endParaRPr lang="en-US"/>
           </a:p>
@@ -1363,7 +1363,7 @@
           <a:p>
             <a:fld id="{DB193B18-CD75-4B3D-8E66-D4A7CE7E24A8}" type="datetimeFigureOut">
               <a:rPr lang="en-US" smtClean="0"/>
-              <a:t>10/26/2023</a:t>
+              <a:t>10/27/2023</a:t>
             </a:fld>
             <a:endParaRPr lang="en-US"/>
           </a:p>
@@ -1710,7 +1710,7 @@
           <a:p>
             <a:fld id="{DB193B18-CD75-4B3D-8E66-D4A7CE7E24A8}" type="datetimeFigureOut">
               <a:rPr lang="en-US" smtClean="0"/>
-              <a:t>10/26/2023</a:t>
+              <a:t>10/27/2023</a:t>
             </a:fld>
             <a:endParaRPr lang="en-US"/>
           </a:p>
@@ -2084,7 +2084,7 @@
           <a:p>
             <a:fld id="{DB193B18-CD75-4B3D-8E66-D4A7CE7E24A8}" type="datetimeFigureOut">
               <a:rPr lang="en-US" smtClean="0"/>
-              <a:t>10/26/2023</a:t>
+              <a:t>10/27/2023</a:t>
             </a:fld>
             <a:endParaRPr lang="en-US"/>
           </a:p>
@@ -2554,7 +2554,7 @@
           <a:p>
             <a:fld id="{DB193B18-CD75-4B3D-8E66-D4A7CE7E24A8}" type="datetimeFigureOut">
               <a:rPr lang="en-US" smtClean="0"/>
-              <a:t>10/26/2023</a:t>
+              <a:t>10/27/2023</a:t>
             </a:fld>
             <a:endParaRPr lang="en-US"/>
           </a:p>
@@ -2759,7 +2759,7 @@
           <a:p>
             <a:fld id="{DB193B18-CD75-4B3D-8E66-D4A7CE7E24A8}" type="datetimeFigureOut">
               <a:rPr lang="en-US" smtClean="0"/>
-              <a:t>10/26/2023</a:t>
+              <a:t>10/27/2023</a:t>
             </a:fld>
             <a:endParaRPr lang="en-US"/>
           </a:p>
@@ -2970,7 +2970,7 @@
           <a:p>
             <a:fld id="{DB193B18-CD75-4B3D-8E66-D4A7CE7E24A8}" type="datetimeFigureOut">
               <a:rPr lang="en-US" smtClean="0"/>
-              <a:t>10/26/2023</a:t>
+              <a:t>10/27/2023</a:t>
             </a:fld>
             <a:endParaRPr lang="en-US"/>
           </a:p>
@@ -3202,7 +3202,7 @@
           <a:p>
             <a:fld id="{DB193B18-CD75-4B3D-8E66-D4A7CE7E24A8}" type="datetimeFigureOut">
               <a:rPr lang="en-US" smtClean="0"/>
-              <a:t>10/26/2023</a:t>
+              <a:t>10/27/2023</a:t>
             </a:fld>
             <a:endParaRPr lang="en-US"/>
           </a:p>
@@ -3450,7 +3450,7 @@
           <a:p>
             <a:fld id="{DB193B18-CD75-4B3D-8E66-D4A7CE7E24A8}" type="datetimeFigureOut">
               <a:rPr lang="en-US" smtClean="0"/>
-              <a:t>10/26/2023</a:t>
+              <a:t>10/27/2023</a:t>
             </a:fld>
             <a:endParaRPr lang="en-US"/>
           </a:p>
@@ -3748,7 +3748,7 @@
           <a:p>
             <a:fld id="{DB193B18-CD75-4B3D-8E66-D4A7CE7E24A8}" type="datetimeFigureOut">
               <a:rPr lang="en-US" smtClean="0"/>
-              <a:t>10/26/2023</a:t>
+              <a:t>10/27/2023</a:t>
             </a:fld>
             <a:endParaRPr lang="en-US"/>
           </a:p>
@@ -4142,7 +4142,7 @@
           <a:p>
             <a:fld id="{DB193B18-CD75-4B3D-8E66-D4A7CE7E24A8}" type="datetimeFigureOut">
               <a:rPr lang="en-US" smtClean="0"/>
-              <a:t>10/26/2023</a:t>
+              <a:t>10/27/2023</a:t>
             </a:fld>
             <a:endParaRPr lang="en-US"/>
           </a:p>
@@ -4291,7 +4291,7 @@
           <a:p>
             <a:fld id="{DB193B18-CD75-4B3D-8E66-D4A7CE7E24A8}" type="datetimeFigureOut">
               <a:rPr lang="en-US" smtClean="0"/>
-              <a:t>10/26/2023</a:t>
+              <a:t>10/27/2023</a:t>
             </a:fld>
             <a:endParaRPr lang="en-US"/>
           </a:p>
@@ -4417,7 +4417,7 @@
           <a:p>
             <a:fld id="{DB193B18-CD75-4B3D-8E66-D4A7CE7E24A8}" type="datetimeFigureOut">
               <a:rPr lang="en-US" smtClean="0"/>
-              <a:t>10/26/2023</a:t>
+              <a:t>10/27/2023</a:t>
             </a:fld>
             <a:endParaRPr lang="en-US"/>
           </a:p>
@@ -4672,7 +4672,7 @@
           <a:p>
             <a:fld id="{DB193B18-CD75-4B3D-8E66-D4A7CE7E24A8}" type="datetimeFigureOut">
               <a:rPr lang="en-US" smtClean="0"/>
-              <a:t>10/26/2023</a:t>
+              <a:t>10/27/2023</a:t>
             </a:fld>
             <a:endParaRPr lang="en-US"/>
           </a:p>
@@ -4987,7 +4987,7 @@
           <a:p>
             <a:fld id="{DB193B18-CD75-4B3D-8E66-D4A7CE7E24A8}" type="datetimeFigureOut">
               <a:rPr lang="en-US" smtClean="0"/>
-              <a:t>10/26/2023</a:t>
+              <a:t>10/27/2023</a:t>
             </a:fld>
             <a:endParaRPr lang="en-US"/>
           </a:p>
@@ -5338,7 +5338,7 @@
           <a:p>
             <a:fld id="{DB193B18-CD75-4B3D-8E66-D4A7CE7E24A8}" type="datetimeFigureOut">
               <a:rPr lang="en-US" smtClean="0"/>
-              <a:t>10/26/2023</a:t>
+              <a:t>10/27/2023</a:t>
             </a:fld>
             <a:endParaRPr lang="en-US"/>
           </a:p>
@@ -6215,7 +6215,7 @@
       </p:grpSpPr>
       <p:pic>
         <p:nvPicPr>
-          <p:cNvPr id="3" name="Content Placeholder 2"/>
+          <p:cNvPr id="4" name="Content Placeholder 3"/>
           <p:cNvPicPr>
             <a:picLocks noGrp="1" noChangeAspect="1"/>
           </p:cNvPicPr>
@@ -6237,8 +6237,8 @@
         </p:blipFill>
         <p:spPr>
           <a:xfrm>
-            <a:off x="1415705" y="760815"/>
-            <a:ext cx="9413403" cy="4563234"/>
+            <a:off x="1266389" y="767852"/>
+            <a:ext cx="9536596" cy="4627502"/>
           </a:xfrm>
         </p:spPr>
       </p:pic>

</xml_diff>

<commit_message>
add slide about Prometheus
</commit_message>
<xml_diff>
--- a/DataCraft ELT Kimball Modeling with Visual Metabase.pptx
+++ b/DataCraft ELT Kimball Modeling with Visual Metabase.pptx
@@ -11,10 +11,11 @@
     <p:sldId id="257" r:id="rId5"/>
     <p:sldId id="266" r:id="rId6"/>
     <p:sldId id="267" r:id="rId7"/>
-    <p:sldId id="261" r:id="rId8"/>
-    <p:sldId id="260" r:id="rId9"/>
-    <p:sldId id="262" r:id="rId10"/>
-    <p:sldId id="264" r:id="rId11"/>
+    <p:sldId id="268" r:id="rId8"/>
+    <p:sldId id="261" r:id="rId9"/>
+    <p:sldId id="260" r:id="rId10"/>
+    <p:sldId id="262" r:id="rId11"/>
+    <p:sldId id="264" r:id="rId12"/>
   </p:sldIdLst>
   <p:sldSz cx="12192000" cy="6858000"/>
   <p:notesSz cx="6858000" cy="9144000"/>
@@ -119,6 +120,32 @@
     </p:ext>
   </p:extLst>
 </p:presentation>
+</file>
+
+<file path=ppt/commentAuthors.xml><?xml version="1.0" encoding="utf-8"?>
+<p:cmAuthorLst xmlns:a="http://schemas.openxmlformats.org/drawingml/2006/main" xmlns:r="http://schemas.openxmlformats.org/officeDocument/2006/relationships" xmlns:p="http://schemas.openxmlformats.org/presentationml/2006/main">
+  <p:cmAuthor id="1" name="Microsoft account" initials="Ma" lastIdx="1" clrIdx="0">
+    <p:extLst>
+      <p:ext uri="{19B8F6BF-5375-455C-9EA6-DF929625EA0E}">
+        <p15:presenceInfo xmlns:p15="http://schemas.microsoft.com/office/powerpoint/2012/main" userId="e63383797511f9bf" providerId="Windows Live"/>
+      </p:ext>
+    </p:extLst>
+  </p:cmAuthor>
+</p:cmAuthorLst>
+</file>
+
+<file path=ppt/comments/comment1.xml><?xml version="1.0" encoding="utf-8"?>
+<p:cmLst xmlns:a="http://schemas.openxmlformats.org/drawingml/2006/main" xmlns:r="http://schemas.openxmlformats.org/officeDocument/2006/relationships" xmlns:p="http://schemas.openxmlformats.org/presentationml/2006/main">
+  <p:cm authorId="1" dt="2023-11-02T14:03:16.200" idx="1">
+    <p:pos x="102" y="73"/>
+    <p:text>Raw data from faker will be extracted by polars into csv format, then PostgresOperator with .sql write to postgres. after that airflow send dbt run command to transformation data. airflow will use the metabase api to send reports via email. a metabase get data from postgres to visualization. and use prometheus for monitoring.</p:text>
+    <p:extLst>
+      <p:ext uri="{C676402C-5697-4E1C-873F-D02D1690AC5C}">
+        <p15:threadingInfo xmlns:p15="http://schemas.microsoft.com/office/powerpoint/2012/main" timeZoneBias="-420"/>
+      </p:ext>
+    </p:extLst>
+  </p:cm>
+</p:cmLst>
 </file>
 
 <file path=ppt/slideLayouts/slideLayout1.xml><?xml version="1.0" encoding="utf-8"?>
@@ -6107,6 +6134,199 @@
       </p:grpSpPr>
       <p:pic>
         <p:nvPicPr>
+          <p:cNvPr id="8" name="Picture 7"/>
+          <p:cNvPicPr>
+            <a:picLocks noChangeAspect="1"/>
+          </p:cNvPicPr>
+          <p:nvPr/>
+        </p:nvPicPr>
+        <p:blipFill>
+          <a:blip r:embed="rId2" cstate="print">
+            <a:extLst>
+              <a:ext uri="{28A0092B-C50C-407E-A947-70E740481C1C}">
+                <a14:useLocalDpi xmlns:a14="http://schemas.microsoft.com/office/drawing/2010/main" val="0"/>
+              </a:ext>
+            </a:extLst>
+          </a:blip>
+          <a:stretch>
+            <a:fillRect/>
+          </a:stretch>
+        </p:blipFill>
+        <p:spPr>
+          <a:xfrm>
+            <a:off x="5651500" y="660401"/>
+            <a:ext cx="2614612" cy="5537200"/>
+          </a:xfrm>
+          <a:prstGeom prst="rect">
+            <a:avLst/>
+          </a:prstGeom>
+        </p:spPr>
+        <p:style>
+          <a:lnRef idx="2">
+            <a:schemeClr val="dk1"/>
+          </a:lnRef>
+          <a:fillRef idx="1">
+            <a:schemeClr val="lt1"/>
+          </a:fillRef>
+          <a:effectRef idx="0">
+            <a:schemeClr val="dk1"/>
+          </a:effectRef>
+          <a:fontRef idx="minor">
+            <a:schemeClr val="dk1"/>
+          </a:fontRef>
+        </p:style>
+      </p:pic>
+      <p:pic>
+        <p:nvPicPr>
+          <p:cNvPr id="9" name="Picture 8"/>
+          <p:cNvPicPr>
+            <a:picLocks noChangeAspect="1"/>
+          </p:cNvPicPr>
+          <p:nvPr/>
+        </p:nvPicPr>
+        <p:blipFill>
+          <a:blip r:embed="rId3" cstate="print">
+            <a:extLst>
+              <a:ext uri="{28A0092B-C50C-407E-A947-70E740481C1C}">
+                <a14:useLocalDpi xmlns:a14="http://schemas.microsoft.com/office/drawing/2010/main" val="0"/>
+              </a:ext>
+            </a:extLst>
+          </a:blip>
+          <a:stretch>
+            <a:fillRect/>
+          </a:stretch>
+        </p:blipFill>
+        <p:spPr>
+          <a:xfrm>
+            <a:off x="8313736" y="648586"/>
+            <a:ext cx="2613600" cy="5549014"/>
+          </a:xfrm>
+          <a:prstGeom prst="rect">
+            <a:avLst/>
+          </a:prstGeom>
+        </p:spPr>
+        <p:style>
+          <a:lnRef idx="2">
+            <a:schemeClr val="dk1"/>
+          </a:lnRef>
+          <a:fillRef idx="1">
+            <a:schemeClr val="lt1"/>
+          </a:fillRef>
+          <a:effectRef idx="0">
+            <a:schemeClr val="dk1"/>
+          </a:effectRef>
+          <a:fontRef idx="minor">
+            <a:schemeClr val="dk1"/>
+          </a:fontRef>
+        </p:style>
+      </p:pic>
+      <p:sp>
+        <p:nvSpPr>
+          <p:cNvPr id="11" name="TextBox 10"/>
+          <p:cNvSpPr txBox="1"/>
+          <p:nvPr/>
+        </p:nvSpPr>
+        <p:spPr>
+          <a:xfrm>
+            <a:off x="1296539" y="1378422"/>
+            <a:ext cx="3111688" cy="1015663"/>
+          </a:xfrm>
+          <a:prstGeom prst="rect">
+            <a:avLst/>
+          </a:prstGeom>
+          <a:noFill/>
+        </p:spPr>
+        <p:txBody>
+          <a:bodyPr wrap="square" rtlCol="0">
+            <a:spAutoFit/>
+          </a:bodyPr>
+          <a:lstStyle/>
+          <a:p>
+            <a:r>
+              <a:rPr lang="en-US" sz="3000" dirty="0" smtClean="0">
+                <a:latin typeface="+mj-lt"/>
+              </a:rPr>
+              <a:t>Telegram and Slack Notifications</a:t>
+            </a:r>
+            <a:endParaRPr lang="en-US" sz="3000" dirty="0">
+              <a:latin typeface="+mj-lt"/>
+            </a:endParaRPr>
+          </a:p>
+        </p:txBody>
+      </p:sp>
+      <p:sp>
+        <p:nvSpPr>
+          <p:cNvPr id="12" name="TextBox 11"/>
+          <p:cNvSpPr txBox="1"/>
+          <p:nvPr/>
+        </p:nvSpPr>
+        <p:spPr>
+          <a:xfrm>
+            <a:off x="1296539" y="2538483"/>
+            <a:ext cx="4039736" cy="1015663"/>
+          </a:xfrm>
+          <a:prstGeom prst="rect">
+            <a:avLst/>
+          </a:prstGeom>
+          <a:noFill/>
+        </p:spPr>
+        <p:txBody>
+          <a:bodyPr wrap="square" rtlCol="0">
+            <a:spAutoFit/>
+          </a:bodyPr>
+          <a:lstStyle/>
+          <a:p>
+            <a:r>
+              <a:rPr lang="en-US" sz="2000" dirty="0"/>
+              <a:t>a</a:t>
+            </a:r>
+            <a:r>
+              <a:rPr lang="en-US" sz="2000" dirty="0" smtClean="0"/>
+              <a:t>ll statuses on the airflow task instance are success, retry, failure. Also sent to Telegram and Slack.</a:t>
+            </a:r>
+            <a:endParaRPr lang="en-US" sz="2000" dirty="0"/>
+          </a:p>
+        </p:txBody>
+      </p:sp>
+    </p:spTree>
+    <p:extLst>
+      <p:ext uri="{BB962C8B-B14F-4D97-AF65-F5344CB8AC3E}">
+        <p14:creationId xmlns:p14="http://schemas.microsoft.com/office/powerpoint/2010/main" val="672279880"/>
+      </p:ext>
+    </p:extLst>
+  </p:cSld>
+  <p:clrMapOvr>
+    <a:masterClrMapping/>
+  </p:clrMapOvr>
+  <p:timing>
+    <p:tnLst>
+      <p:par>
+        <p:cTn id="1" dur="indefinite" restart="never" nodeType="tmRoot"/>
+      </p:par>
+    </p:tnLst>
+  </p:timing>
+</p:sld>
+</file>
+
+<file path=ppt/slides/slide11.xml><?xml version="1.0" encoding="utf-8"?>
+<p:sld xmlns:a="http://schemas.openxmlformats.org/drawingml/2006/main" xmlns:r="http://schemas.openxmlformats.org/officeDocument/2006/relationships" xmlns:p="http://schemas.openxmlformats.org/presentationml/2006/main">
+  <p:cSld>
+    <p:spTree>
+      <p:nvGrpSpPr>
+        <p:cNvPr id="1" name=""/>
+        <p:cNvGrpSpPr/>
+        <p:nvPr/>
+      </p:nvGrpSpPr>
+      <p:grpSpPr>
+        <a:xfrm>
+          <a:off x="0" y="0"/>
+          <a:ext cx="0" cy="0"/>
+          <a:chOff x="0" y="0"/>
+          <a:chExt cx="0" cy="0"/>
+        </a:xfrm>
+      </p:grpSpPr>
+      <p:pic>
+        <p:nvPicPr>
           <p:cNvPr id="5" name="Picture 4"/>
           <p:cNvPicPr>
             <a:picLocks noChangeAspect="1"/>
@@ -6237,21 +6457,21 @@
         </p:blipFill>
         <p:spPr>
           <a:xfrm>
-            <a:off x="1855516" y="853129"/>
-            <a:ext cx="8490268" cy="4537614"/>
+            <a:off x="863302" y="635618"/>
+            <a:ext cx="10501439" cy="5612482"/>
           </a:xfrm>
         </p:spPr>
       </p:pic>
       <p:sp>
         <p:nvSpPr>
-          <p:cNvPr id="8" name="TextBox 7"/>
+          <p:cNvPr id="2" name="TextBox 1"/>
           <p:cNvSpPr txBox="1"/>
           <p:nvPr/>
         </p:nvSpPr>
         <p:spPr>
           <a:xfrm>
-            <a:off x="4102503" y="641444"/>
-            <a:ext cx="4012830" cy="553998"/>
+            <a:off x="3802564" y="501804"/>
+            <a:ext cx="4153894" cy="553998"/>
           </a:xfrm>
           <a:prstGeom prst="rect">
             <a:avLst/>
@@ -6265,136 +6485,10 @@
           <a:lstStyle/>
           <a:p>
             <a:r>
-              <a:rPr lang="en-US" sz="3000" dirty="0" smtClean="0">
-                <a:latin typeface="+mj-lt"/>
-              </a:rPr>
-              <a:t>Infrastructure of Pipeline</a:t>
-            </a:r>
-            <a:endParaRPr lang="en-US" sz="3000" dirty="0">
-              <a:latin typeface="+mj-lt"/>
-            </a:endParaRPr>
-          </a:p>
-        </p:txBody>
-      </p:sp>
-      <p:sp>
-        <p:nvSpPr>
-          <p:cNvPr id="9" name="TextBox 8"/>
-          <p:cNvSpPr txBox="1"/>
-          <p:nvPr/>
-        </p:nvSpPr>
-        <p:spPr>
-          <a:xfrm>
-            <a:off x="592746" y="5180329"/>
-            <a:ext cx="11098510" cy="1015663"/>
-          </a:xfrm>
-          <a:prstGeom prst="rect">
-            <a:avLst/>
-          </a:prstGeom>
-          <a:noFill/>
-        </p:spPr>
-        <p:txBody>
-          <a:bodyPr wrap="square" rtlCol="0">
-            <a:spAutoFit/>
-          </a:bodyPr>
-          <a:lstStyle/>
-          <a:p>
-            <a:r>
-              <a:rPr lang="en-US" sz="2000" dirty="0" smtClean="0"/>
-              <a:t>Raw data from faker will be extracted by </a:t>
-            </a:r>
-            <a:r>
-              <a:rPr lang="en-US" sz="2000" dirty="0" err="1" smtClean="0"/>
-              <a:t>polars</a:t>
-            </a:r>
-            <a:r>
-              <a:rPr lang="en-US" sz="2000" dirty="0" smtClean="0"/>
-              <a:t> into </a:t>
-            </a:r>
-            <a:r>
-              <a:rPr lang="en-US" sz="2000" dirty="0" err="1" smtClean="0"/>
-              <a:t>csv</a:t>
-            </a:r>
-            <a:r>
-              <a:rPr lang="en-US" sz="2000" dirty="0" smtClean="0"/>
-              <a:t> format, then </a:t>
-            </a:r>
-            <a:r>
-              <a:rPr lang="en-US" sz="2000" dirty="0" err="1" smtClean="0"/>
-              <a:t>PostgresOperator</a:t>
-            </a:r>
-            <a:r>
-              <a:rPr lang="en-US" sz="2000" dirty="0"/>
-              <a:t> </a:t>
-            </a:r>
-            <a:r>
-              <a:rPr lang="en-US" sz="2000" dirty="0" smtClean="0"/>
-              <a:t>with .</a:t>
-            </a:r>
-            <a:r>
-              <a:rPr lang="en-US" sz="2000" dirty="0" err="1" smtClean="0"/>
-              <a:t>sql</a:t>
-            </a:r>
-            <a:r>
-              <a:rPr lang="en-US" sz="2000" dirty="0" smtClean="0"/>
-              <a:t> write to </a:t>
-            </a:r>
-            <a:r>
-              <a:rPr lang="en-US" sz="2000" dirty="0" err="1" smtClean="0"/>
-              <a:t>postgres</a:t>
-            </a:r>
-            <a:r>
-              <a:rPr lang="en-US" sz="2000" dirty="0" smtClean="0"/>
-              <a:t>. after that airflow send </a:t>
-            </a:r>
-            <a:r>
-              <a:rPr lang="en-US" sz="2000" dirty="0" err="1" smtClean="0"/>
-              <a:t>dbt</a:t>
-            </a:r>
-            <a:r>
-              <a:rPr lang="en-US" sz="2000" dirty="0" smtClean="0"/>
-              <a:t> run command to transformation data. airflow will use the </a:t>
-            </a:r>
-            <a:r>
-              <a:rPr lang="en-US" sz="2000" dirty="0" err="1" smtClean="0"/>
-              <a:t>metabase</a:t>
-            </a:r>
-            <a:r>
-              <a:rPr lang="en-US" sz="2000" dirty="0" smtClean="0"/>
-              <a:t> </a:t>
-            </a:r>
-            <a:r>
-              <a:rPr lang="en-US" sz="2000" dirty="0" err="1" smtClean="0"/>
-              <a:t>api</a:t>
-            </a:r>
-            <a:r>
-              <a:rPr lang="en-US" sz="2000" dirty="0" smtClean="0"/>
-              <a:t> to send reports via email. a </a:t>
-            </a:r>
-            <a:r>
-              <a:rPr lang="en-US" sz="2000" dirty="0" err="1" smtClean="0"/>
-              <a:t>metabase</a:t>
-            </a:r>
-            <a:r>
-              <a:rPr lang="en-US" sz="2000" dirty="0" smtClean="0"/>
-              <a:t> get data from </a:t>
-            </a:r>
-            <a:r>
-              <a:rPr lang="en-US" sz="2000" dirty="0" err="1" smtClean="0"/>
-              <a:t>postgres</a:t>
-            </a:r>
-            <a:r>
-              <a:rPr lang="en-US" sz="2000" dirty="0" smtClean="0"/>
-              <a:t> to visualization. and use </a:t>
-            </a:r>
-            <a:r>
-              <a:rPr lang="en-US" sz="2000" dirty="0" err="1" smtClean="0"/>
-              <a:t>prometheus</a:t>
-            </a:r>
-            <a:r>
-              <a:rPr lang="en-US" sz="2000" dirty="0" smtClean="0"/>
-              <a:t> for monitoring.</a:t>
-            </a:r>
-            <a:endParaRPr lang="en-US" sz="2000" dirty="0"/>
+              <a:rPr lang="en-US" sz="3000" dirty="0" smtClean="0"/>
+              <a:t>Infrastructure of Pipelines</a:t>
+            </a:r>
+            <a:endParaRPr lang="en-US" sz="3000" dirty="0"/>
           </a:p>
         </p:txBody>
       </p:sp>
@@ -7031,6 +7125,134 @@
           </p:style>
         </p:cxnSp>
       </p:grpSp>
+      <p:sp>
+        <p:nvSpPr>
+          <p:cNvPr id="20" name="TextBox 19"/>
+          <p:cNvSpPr txBox="1"/>
+          <p:nvPr/>
+        </p:nvSpPr>
+        <p:spPr>
+          <a:xfrm>
+            <a:off x="8412731" y="4308009"/>
+            <a:ext cx="1623253" cy="783193"/>
+          </a:xfrm>
+          <a:prstGeom prst="roundRect">
+            <a:avLst/>
+          </a:prstGeom>
+          <a:ln/>
+        </p:spPr>
+        <p:style>
+          <a:lnRef idx="2">
+            <a:schemeClr val="dk1"/>
+          </a:lnRef>
+          <a:fillRef idx="1">
+            <a:schemeClr val="lt1"/>
+          </a:fillRef>
+          <a:effectRef idx="0">
+            <a:schemeClr val="dk1"/>
+          </a:effectRef>
+          <a:fontRef idx="minor">
+            <a:schemeClr val="dk1"/>
+          </a:fontRef>
+        </p:style>
+        <p:txBody>
+          <a:bodyPr wrap="square" rtlCol="0">
+            <a:spAutoFit/>
+          </a:bodyPr>
+          <a:lstStyle/>
+          <a:p>
+            <a:r>
+              <a:rPr lang="en-US" sz="2000" dirty="0" smtClean="0">
+                <a:latin typeface="Comic Sans MS" panose="030F0702030302020204" pitchFamily="66" charset="0"/>
+              </a:rPr>
+              <a:t>     Data</a:t>
+            </a:r>
+          </a:p>
+          <a:p>
+            <a:r>
+              <a:rPr lang="en-US" sz="2000" dirty="0" smtClean="0">
+                <a:latin typeface="Comic Sans MS" panose="030F0702030302020204" pitchFamily="66" charset="0"/>
+              </a:rPr>
+              <a:t>Governance</a:t>
+            </a:r>
+            <a:endParaRPr lang="en-US" sz="2000" dirty="0">
+              <a:latin typeface="Comic Sans MS" panose="030F0702030302020204" pitchFamily="66" charset="0"/>
+            </a:endParaRPr>
+          </a:p>
+        </p:txBody>
+      </p:sp>
+      <p:cxnSp>
+        <p:nvCxnSpPr>
+          <p:cNvPr id="7" name="Elbow Connector 6"/>
+          <p:cNvCxnSpPr>
+            <a:stCxn id="87" idx="2"/>
+            <a:endCxn id="20" idx="1"/>
+          </p:cNvCxnSpPr>
+          <p:nvPr/>
+        </p:nvCxnSpPr>
+        <p:spPr>
+          <a:xfrm rot="16200000" flipH="1">
+            <a:off x="7555412" y="3842287"/>
+            <a:ext cx="1044250" cy="670387"/>
+          </a:xfrm>
+          <a:prstGeom prst="bentConnector2">
+            <a:avLst/>
+          </a:prstGeom>
+          <a:ln>
+            <a:tailEnd type="triangle"/>
+          </a:ln>
+        </p:spPr>
+        <p:style>
+          <a:lnRef idx="1">
+            <a:schemeClr val="accent1"/>
+          </a:lnRef>
+          <a:fillRef idx="0">
+            <a:schemeClr val="accent1"/>
+          </a:fillRef>
+          <a:effectRef idx="0">
+            <a:schemeClr val="accent1"/>
+          </a:effectRef>
+          <a:fontRef idx="minor">
+            <a:schemeClr val="tx1"/>
+          </a:fontRef>
+        </p:style>
+      </p:cxnSp>
+      <p:cxnSp>
+        <p:nvCxnSpPr>
+          <p:cNvPr id="27" name="Elbow Connector 26"/>
+          <p:cNvCxnSpPr>
+            <a:stCxn id="88" idx="2"/>
+            <a:endCxn id="20" idx="3"/>
+          </p:cNvCxnSpPr>
+          <p:nvPr/>
+        </p:nvCxnSpPr>
+        <p:spPr>
+          <a:xfrm rot="5400000">
+            <a:off x="9769469" y="3888271"/>
+            <a:ext cx="1077850" cy="544820"/>
+          </a:xfrm>
+          <a:prstGeom prst="bentConnector2">
+            <a:avLst/>
+          </a:prstGeom>
+          <a:ln>
+            <a:tailEnd type="triangle"/>
+          </a:ln>
+        </p:spPr>
+        <p:style>
+          <a:lnRef idx="1">
+            <a:schemeClr val="accent1"/>
+          </a:lnRef>
+          <a:fillRef idx="0">
+            <a:schemeClr val="accent1"/>
+          </a:fillRef>
+          <a:effectRef idx="0">
+            <a:schemeClr val="accent1"/>
+          </a:effectRef>
+          <a:fontRef idx="minor">
+            <a:schemeClr val="tx1"/>
+          </a:fontRef>
+        </p:style>
+      </p:cxnSp>
     </p:spTree>
     <p:extLst>
       <p:ext uri="{BB962C8B-B14F-4D97-AF65-F5344CB8AC3E}">
@@ -7398,291 +7620,318 @@
           </a:p>
         </p:txBody>
       </p:sp>
-      <p:sp>
-        <p:nvSpPr>
-          <p:cNvPr id="9" name="TextBox 8"/>
-          <p:cNvSpPr txBox="1"/>
+      <p:grpSp>
+        <p:nvGrpSpPr>
+          <p:cNvPr id="23" name="Group 22"/>
+          <p:cNvGrpSpPr/>
           <p:nvPr/>
-        </p:nvSpPr>
-        <p:spPr>
-          <a:xfrm>
-            <a:off x="1476102" y="3122024"/>
-            <a:ext cx="1907177" cy="1246495"/>
-          </a:xfrm>
-          <a:prstGeom prst="rect">
-            <a:avLst/>
-          </a:prstGeom>
-        </p:spPr>
-        <p:style>
-          <a:lnRef idx="2">
-            <a:schemeClr val="dk1"/>
-          </a:lnRef>
-          <a:fillRef idx="1">
-            <a:schemeClr val="lt1"/>
-          </a:fillRef>
-          <a:effectRef idx="0">
-            <a:schemeClr val="dk1"/>
-          </a:effectRef>
-          <a:fontRef idx="minor">
-            <a:schemeClr val="dk1"/>
-          </a:fontRef>
-        </p:style>
-        <p:txBody>
-          <a:bodyPr wrap="square" rtlCol="0">
-            <a:spAutoFit/>
-          </a:bodyPr>
-          <a:lstStyle/>
-          <a:p>
-            <a:pPr algn="ctr"/>
-            <a:r>
-              <a:rPr lang="en-US" sz="2500" dirty="0" err="1" smtClean="0"/>
-              <a:t>Dbt</a:t>
-            </a:r>
-            <a:r>
-              <a:rPr lang="en-US" sz="2500" dirty="0" smtClean="0"/>
-              <a:t> Project &amp; </a:t>
-            </a:r>
-          </a:p>
-          <a:p>
-            <a:pPr algn="ctr"/>
-            <a:r>
-              <a:rPr lang="en-US" sz="2500" dirty="0" smtClean="0"/>
-              <a:t>Profiles</a:t>
-            </a:r>
-            <a:endParaRPr lang="en-US" sz="2500" dirty="0"/>
-          </a:p>
-        </p:txBody>
-      </p:sp>
-      <p:sp>
-        <p:nvSpPr>
-          <p:cNvPr id="10" name="TextBox 9"/>
-          <p:cNvSpPr txBox="1"/>
-          <p:nvPr/>
-        </p:nvSpPr>
-        <p:spPr>
-          <a:xfrm>
-            <a:off x="4267204" y="3506744"/>
-            <a:ext cx="1415143" cy="477054"/>
-          </a:xfrm>
-          <a:prstGeom prst="rect">
-            <a:avLst/>
-          </a:prstGeom>
-        </p:spPr>
-        <p:style>
-          <a:lnRef idx="2">
-            <a:schemeClr val="dk1"/>
-          </a:lnRef>
-          <a:fillRef idx="1">
-            <a:schemeClr val="lt1"/>
-          </a:fillRef>
-          <a:effectRef idx="0">
-            <a:schemeClr val="dk1"/>
-          </a:effectRef>
-          <a:fontRef idx="minor">
-            <a:schemeClr val="dk1"/>
-          </a:fontRef>
-        </p:style>
-        <p:txBody>
-          <a:bodyPr wrap="square" rtlCol="0">
-            <a:spAutoFit/>
-          </a:bodyPr>
-          <a:lstStyle/>
-          <a:p>
-            <a:r>
-              <a:rPr lang="en-US" sz="2500" dirty="0" smtClean="0"/>
-              <a:t>Models</a:t>
-            </a:r>
-            <a:endParaRPr lang="en-US" sz="2500" dirty="0"/>
-          </a:p>
-        </p:txBody>
-      </p:sp>
-      <p:sp>
-        <p:nvSpPr>
-          <p:cNvPr id="11" name="TextBox 10"/>
-          <p:cNvSpPr txBox="1"/>
-          <p:nvPr/>
-        </p:nvSpPr>
-        <p:spPr>
-          <a:xfrm>
-            <a:off x="6579335" y="3506744"/>
-            <a:ext cx="1506583" cy="477054"/>
-          </a:xfrm>
-          <a:prstGeom prst="rect">
-            <a:avLst/>
-          </a:prstGeom>
-        </p:spPr>
-        <p:style>
-          <a:lnRef idx="2">
-            <a:schemeClr val="dk1"/>
-          </a:lnRef>
-          <a:fillRef idx="1">
-            <a:schemeClr val="lt1"/>
-          </a:fillRef>
-          <a:effectRef idx="0">
-            <a:schemeClr val="dk1"/>
-          </a:effectRef>
-          <a:fontRef idx="minor">
-            <a:schemeClr val="dk1"/>
-          </a:fontRef>
-        </p:style>
-        <p:txBody>
-          <a:bodyPr wrap="square" rtlCol="0">
-            <a:spAutoFit/>
-          </a:bodyPr>
-          <a:lstStyle/>
-          <a:p>
-            <a:r>
-              <a:rPr lang="en-US" sz="2500" dirty="0" smtClean="0"/>
-              <a:t>Schema</a:t>
-            </a:r>
-            <a:endParaRPr lang="en-US" sz="2500" dirty="0"/>
-          </a:p>
-        </p:txBody>
-      </p:sp>
-      <p:sp>
-        <p:nvSpPr>
-          <p:cNvPr id="12" name="TextBox 11"/>
-          <p:cNvSpPr txBox="1"/>
-          <p:nvPr/>
-        </p:nvSpPr>
-        <p:spPr>
-          <a:xfrm>
-            <a:off x="8982906" y="3506744"/>
-            <a:ext cx="901337" cy="477054"/>
-          </a:xfrm>
-          <a:prstGeom prst="rect">
-            <a:avLst/>
-          </a:prstGeom>
-        </p:spPr>
-        <p:style>
-          <a:lnRef idx="2">
-            <a:schemeClr val="dk1"/>
-          </a:lnRef>
-          <a:fillRef idx="1">
-            <a:schemeClr val="lt1"/>
-          </a:fillRef>
-          <a:effectRef idx="0">
-            <a:schemeClr val="dk1"/>
-          </a:effectRef>
-          <a:fontRef idx="minor">
-            <a:schemeClr val="dk1"/>
-          </a:fontRef>
-        </p:style>
-        <p:txBody>
-          <a:bodyPr wrap="square" rtlCol="0">
-            <a:spAutoFit/>
-          </a:bodyPr>
-          <a:lstStyle/>
-          <a:p>
-            <a:r>
-              <a:rPr lang="en-US" sz="2500" dirty="0" smtClean="0"/>
-              <a:t>SQL</a:t>
-            </a:r>
-            <a:endParaRPr lang="en-US" sz="2500" dirty="0"/>
-          </a:p>
-        </p:txBody>
-      </p:sp>
-      <p:cxnSp>
-        <p:nvCxnSpPr>
-          <p:cNvPr id="14" name="Straight Arrow Connector 13"/>
-          <p:cNvCxnSpPr>
-            <a:endCxn id="10" idx="1"/>
-          </p:cNvCxnSpPr>
-          <p:nvPr/>
-        </p:nvCxnSpPr>
-        <p:spPr>
-          <a:xfrm>
-            <a:off x="3370216" y="3745271"/>
-            <a:ext cx="896988" cy="0"/>
-          </a:xfrm>
-          <a:prstGeom prst="straightConnector1">
-            <a:avLst/>
-          </a:prstGeom>
-          <a:ln w="38100">
-            <a:tailEnd type="triangle"/>
-          </a:ln>
-        </p:spPr>
-        <p:style>
-          <a:lnRef idx="1">
-            <a:schemeClr val="accent1"/>
-          </a:lnRef>
-          <a:fillRef idx="0">
-            <a:schemeClr val="accent1"/>
-          </a:fillRef>
-          <a:effectRef idx="0">
-            <a:schemeClr val="accent1"/>
-          </a:effectRef>
-          <a:fontRef idx="minor">
-            <a:schemeClr val="tx1"/>
-          </a:fontRef>
-        </p:style>
-      </p:cxnSp>
-      <p:cxnSp>
-        <p:nvCxnSpPr>
-          <p:cNvPr id="15" name="Straight Arrow Connector 14"/>
-          <p:cNvCxnSpPr/>
-          <p:nvPr/>
-        </p:nvCxnSpPr>
-        <p:spPr>
-          <a:xfrm>
-            <a:off x="5682347" y="3705124"/>
-            <a:ext cx="896988" cy="0"/>
-          </a:xfrm>
-          <a:prstGeom prst="straightConnector1">
-            <a:avLst/>
-          </a:prstGeom>
-          <a:ln w="38100">
-            <a:tailEnd type="triangle"/>
-          </a:ln>
-        </p:spPr>
-        <p:style>
-          <a:lnRef idx="1">
-            <a:schemeClr val="accent1"/>
-          </a:lnRef>
-          <a:fillRef idx="0">
-            <a:schemeClr val="accent1"/>
-          </a:fillRef>
-          <a:effectRef idx="0">
-            <a:schemeClr val="accent1"/>
-          </a:effectRef>
-          <a:fontRef idx="minor">
-            <a:schemeClr val="tx1"/>
-          </a:fontRef>
-        </p:style>
-      </p:cxnSp>
-      <p:cxnSp>
-        <p:nvCxnSpPr>
-          <p:cNvPr id="16" name="Straight Arrow Connector 15"/>
-          <p:cNvCxnSpPr/>
-          <p:nvPr/>
-        </p:nvCxnSpPr>
-        <p:spPr>
-          <a:xfrm>
-            <a:off x="8085918" y="3706603"/>
-            <a:ext cx="896988" cy="0"/>
-          </a:xfrm>
-          <a:prstGeom prst="straightConnector1">
-            <a:avLst/>
-          </a:prstGeom>
-          <a:ln w="38100">
-            <a:tailEnd type="triangle"/>
-          </a:ln>
-        </p:spPr>
-        <p:style>
-          <a:lnRef idx="1">
-            <a:schemeClr val="accent1"/>
-          </a:lnRef>
-          <a:fillRef idx="0">
-            <a:schemeClr val="accent1"/>
-          </a:fillRef>
-          <a:effectRef idx="0">
-            <a:schemeClr val="accent1"/>
-          </a:effectRef>
-          <a:fontRef idx="minor">
-            <a:schemeClr val="tx1"/>
-          </a:fontRef>
-        </p:style>
-      </p:cxnSp>
+        </p:nvGrpSpPr>
+        <p:grpSpPr>
+          <a:xfrm>
+            <a:off x="1386894" y="3155477"/>
+            <a:ext cx="9291943" cy="1246495"/>
+            <a:chOff x="1476102" y="3122024"/>
+            <a:chExt cx="9291943" cy="1246495"/>
+          </a:xfrm>
+        </p:grpSpPr>
+        <p:sp>
+          <p:nvSpPr>
+            <p:cNvPr id="9" name="TextBox 8"/>
+            <p:cNvSpPr txBox="1"/>
+            <p:nvPr/>
+          </p:nvSpPr>
+          <p:spPr>
+            <a:xfrm>
+              <a:off x="1476102" y="3122024"/>
+              <a:ext cx="2293010" cy="1246495"/>
+            </a:xfrm>
+            <a:prstGeom prst="rect">
+              <a:avLst/>
+            </a:prstGeom>
+          </p:spPr>
+          <p:style>
+            <a:lnRef idx="0">
+              <a:schemeClr val="accent1"/>
+            </a:lnRef>
+            <a:fillRef idx="3">
+              <a:schemeClr val="accent1"/>
+            </a:fillRef>
+            <a:effectRef idx="3">
+              <a:schemeClr val="accent1"/>
+            </a:effectRef>
+            <a:fontRef idx="minor">
+              <a:schemeClr val="lt1"/>
+            </a:fontRef>
+          </p:style>
+          <p:txBody>
+            <a:bodyPr wrap="square" rtlCol="0">
+              <a:spAutoFit/>
+            </a:bodyPr>
+            <a:lstStyle/>
+            <a:p>
+              <a:pPr algn="ctr"/>
+              <a:r>
+                <a:rPr lang="en-US" sz="2500" dirty="0" err="1"/>
+                <a:t>dbt_project</a:t>
+              </a:r>
+              <a:r>
+                <a:rPr lang="en-US" sz="2500" dirty="0" err="1" smtClean="0"/>
+                <a:t>.yaml</a:t>
+              </a:r>
+              <a:r>
+                <a:rPr lang="en-US" sz="2500" dirty="0" smtClean="0"/>
+                <a:t> and</a:t>
+              </a:r>
+              <a:endParaRPr lang="en-US" sz="2500" dirty="0" smtClean="0"/>
+            </a:p>
+            <a:p>
+              <a:pPr algn="ctr"/>
+              <a:r>
+                <a:rPr lang="en-US" sz="2500" dirty="0" err="1" smtClean="0"/>
+                <a:t>profiles.yaml</a:t>
+              </a:r>
+              <a:endParaRPr lang="en-US" sz="2500" dirty="0"/>
+            </a:p>
+          </p:txBody>
+        </p:sp>
+        <p:sp>
+          <p:nvSpPr>
+            <p:cNvPr id="10" name="TextBox 9"/>
+            <p:cNvSpPr txBox="1"/>
+            <p:nvPr/>
+          </p:nvSpPr>
+          <p:spPr>
+            <a:xfrm>
+              <a:off x="4927682" y="3506744"/>
+              <a:ext cx="1415143" cy="477054"/>
+            </a:xfrm>
+            <a:prstGeom prst="rect">
+              <a:avLst/>
+            </a:prstGeom>
+          </p:spPr>
+          <p:style>
+            <a:lnRef idx="0">
+              <a:schemeClr val="accent1"/>
+            </a:lnRef>
+            <a:fillRef idx="3">
+              <a:schemeClr val="accent1"/>
+            </a:fillRef>
+            <a:effectRef idx="3">
+              <a:schemeClr val="accent1"/>
+            </a:effectRef>
+            <a:fontRef idx="minor">
+              <a:schemeClr val="lt1"/>
+            </a:fontRef>
+          </p:style>
+          <p:txBody>
+            <a:bodyPr wrap="square" rtlCol="0">
+              <a:spAutoFit/>
+            </a:bodyPr>
+            <a:lstStyle/>
+            <a:p>
+              <a:r>
+                <a:rPr lang="en-US" sz="2500" dirty="0" smtClean="0"/>
+                <a:t>  Models</a:t>
+              </a:r>
+              <a:endParaRPr lang="en-US" sz="2500" dirty="0"/>
+            </a:p>
+          </p:txBody>
+        </p:sp>
+        <p:sp>
+          <p:nvSpPr>
+            <p:cNvPr id="11" name="TextBox 10"/>
+            <p:cNvSpPr txBox="1"/>
+            <p:nvPr/>
+          </p:nvSpPr>
+          <p:spPr>
+            <a:xfrm>
+              <a:off x="7412188" y="3500050"/>
+              <a:ext cx="1506583" cy="477054"/>
+            </a:xfrm>
+            <a:prstGeom prst="rect">
+              <a:avLst/>
+            </a:prstGeom>
+          </p:spPr>
+          <p:style>
+            <a:lnRef idx="0">
+              <a:schemeClr val="accent1"/>
+            </a:lnRef>
+            <a:fillRef idx="3">
+              <a:schemeClr val="accent1"/>
+            </a:fillRef>
+            <a:effectRef idx="3">
+              <a:schemeClr val="accent1"/>
+            </a:effectRef>
+            <a:fontRef idx="minor">
+              <a:schemeClr val="lt1"/>
+            </a:fontRef>
+          </p:style>
+          <p:txBody>
+            <a:bodyPr wrap="square" rtlCol="0">
+              <a:spAutoFit/>
+            </a:bodyPr>
+            <a:lstStyle/>
+            <a:p>
+              <a:r>
+                <a:rPr lang="en-US" sz="2500" dirty="0" smtClean="0"/>
+                <a:t>   Schema</a:t>
+              </a:r>
+              <a:endParaRPr lang="en-US" sz="2500" dirty="0"/>
+            </a:p>
+          </p:txBody>
+        </p:sp>
+        <p:sp>
+          <p:nvSpPr>
+            <p:cNvPr id="12" name="TextBox 11"/>
+            <p:cNvSpPr txBox="1"/>
+            <p:nvPr/>
+          </p:nvSpPr>
+          <p:spPr>
+            <a:xfrm>
+              <a:off x="9866708" y="3500050"/>
+              <a:ext cx="901337" cy="477054"/>
+            </a:xfrm>
+            <a:prstGeom prst="rect">
+              <a:avLst/>
+            </a:prstGeom>
+          </p:spPr>
+          <p:style>
+            <a:lnRef idx="0">
+              <a:schemeClr val="accent1"/>
+            </a:lnRef>
+            <a:fillRef idx="3">
+              <a:schemeClr val="accent1"/>
+            </a:fillRef>
+            <a:effectRef idx="3">
+              <a:schemeClr val="accent1"/>
+            </a:effectRef>
+            <a:fontRef idx="minor">
+              <a:schemeClr val="lt1"/>
+            </a:fontRef>
+          </p:style>
+          <p:txBody>
+            <a:bodyPr wrap="square" rtlCol="0">
+              <a:spAutoFit/>
+            </a:bodyPr>
+            <a:lstStyle/>
+            <a:p>
+              <a:r>
+                <a:rPr lang="en-US" sz="2500" dirty="0" smtClean="0"/>
+                <a:t> SQL</a:t>
+              </a:r>
+              <a:endParaRPr lang="en-US" sz="2500" dirty="0"/>
+            </a:p>
+          </p:txBody>
+        </p:sp>
+        <p:cxnSp>
+          <p:nvCxnSpPr>
+            <p:cNvPr id="14" name="Straight Arrow Connector 13"/>
+            <p:cNvCxnSpPr>
+              <a:stCxn id="9" idx="3"/>
+              <a:endCxn id="10" idx="1"/>
+            </p:cNvCxnSpPr>
+            <p:nvPr/>
+          </p:nvCxnSpPr>
+          <p:spPr>
+            <a:xfrm flipV="1">
+              <a:off x="3769112" y="3745271"/>
+              <a:ext cx="1158570" cy="1"/>
+            </a:xfrm>
+            <a:prstGeom prst="straightConnector1">
+              <a:avLst/>
+            </a:prstGeom>
+            <a:ln w="38100">
+              <a:tailEnd type="triangle"/>
+            </a:ln>
+          </p:spPr>
+          <p:style>
+            <a:lnRef idx="1">
+              <a:schemeClr val="accent1"/>
+            </a:lnRef>
+            <a:fillRef idx="0">
+              <a:schemeClr val="accent1"/>
+            </a:fillRef>
+            <a:effectRef idx="0">
+              <a:schemeClr val="accent1"/>
+            </a:effectRef>
+            <a:fontRef idx="minor">
+              <a:schemeClr val="tx1"/>
+            </a:fontRef>
+          </p:style>
+        </p:cxnSp>
+        <p:cxnSp>
+          <p:nvCxnSpPr>
+            <p:cNvPr id="15" name="Straight Arrow Connector 14"/>
+            <p:cNvCxnSpPr>
+              <a:stCxn id="10" idx="3"/>
+              <a:endCxn id="11" idx="1"/>
+            </p:cNvCxnSpPr>
+            <p:nvPr/>
+          </p:nvCxnSpPr>
+          <p:spPr>
+            <a:xfrm flipV="1">
+              <a:off x="6342825" y="3738577"/>
+              <a:ext cx="1069363" cy="6694"/>
+            </a:xfrm>
+            <a:prstGeom prst="straightConnector1">
+              <a:avLst/>
+            </a:prstGeom>
+            <a:ln w="38100">
+              <a:tailEnd type="triangle"/>
+            </a:ln>
+          </p:spPr>
+          <p:style>
+            <a:lnRef idx="1">
+              <a:schemeClr val="accent1"/>
+            </a:lnRef>
+            <a:fillRef idx="0">
+              <a:schemeClr val="accent1"/>
+            </a:fillRef>
+            <a:effectRef idx="0">
+              <a:schemeClr val="accent1"/>
+            </a:effectRef>
+            <a:fontRef idx="minor">
+              <a:schemeClr val="tx1"/>
+            </a:fontRef>
+          </p:style>
+        </p:cxnSp>
+        <p:cxnSp>
+          <p:nvCxnSpPr>
+            <p:cNvPr id="16" name="Straight Arrow Connector 15"/>
+            <p:cNvCxnSpPr>
+              <a:stCxn id="11" idx="3"/>
+              <a:endCxn id="12" idx="1"/>
+            </p:cNvCxnSpPr>
+            <p:nvPr/>
+          </p:nvCxnSpPr>
+          <p:spPr>
+            <a:xfrm>
+              <a:off x="8918771" y="3738577"/>
+              <a:ext cx="947937" cy="0"/>
+            </a:xfrm>
+            <a:prstGeom prst="straightConnector1">
+              <a:avLst/>
+            </a:prstGeom>
+            <a:ln w="38100">
+              <a:tailEnd type="triangle"/>
+            </a:ln>
+          </p:spPr>
+          <p:style>
+            <a:lnRef idx="1">
+              <a:schemeClr val="accent1"/>
+            </a:lnRef>
+            <a:fillRef idx="0">
+              <a:schemeClr val="accent1"/>
+            </a:fillRef>
+            <a:effectRef idx="0">
+              <a:schemeClr val="accent1"/>
+            </a:effectRef>
+            <a:fontRef idx="minor">
+              <a:schemeClr val="tx1"/>
+            </a:fontRef>
+          </p:style>
+        </p:cxnSp>
+      </p:grpSp>
     </p:spTree>
     <p:extLst>
       <p:ext uri="{BB962C8B-B14F-4D97-AF65-F5344CB8AC3E}">
@@ -7732,21 +7981,21 @@
         </p:nvSpPr>
         <p:spPr>
           <a:xfrm>
-            <a:off x="1295402" y="456760"/>
-            <a:ext cx="9601196" cy="1303867"/>
+            <a:off x="1258125" y="536412"/>
+            <a:ext cx="9601196" cy="623315"/>
           </a:xfrm>
         </p:spPr>
         <p:txBody>
           <a:bodyPr>
-            <a:normAutofit/>
+            <a:normAutofit fontScale="90000"/>
           </a:bodyPr>
           <a:lstStyle/>
           <a:p>
             <a:r>
-              <a:rPr lang="en-US" sz="3000" dirty="0" smtClean="0"/>
-              <a:t>Data Hub</a:t>
-            </a:r>
-            <a:endParaRPr lang="en-US" sz="3000" dirty="0"/>
+              <a:rPr lang="en-US" sz="4000" dirty="0" err="1" smtClean="0"/>
+              <a:t>Datahub</a:t>
+            </a:r>
+            <a:endParaRPr lang="en-US" sz="4000" dirty="0"/>
           </a:p>
         </p:txBody>
       </p:sp>
@@ -7768,8 +8017,8 @@
         </p:blipFill>
         <p:spPr>
           <a:xfrm>
-            <a:off x="2719253" y="1447119"/>
-            <a:ext cx="7258278" cy="4783866"/>
+            <a:off x="2429322" y="1159727"/>
+            <a:ext cx="7662532" cy="5050306"/>
           </a:xfrm>
           <a:prstGeom prst="rect">
             <a:avLst/>
@@ -7825,70 +8074,626 @@
         </p:nvSpPr>
         <p:spPr>
           <a:xfrm>
-            <a:off x="1240811" y="449870"/>
-            <a:ext cx="9601196" cy="1303867"/>
+            <a:off x="1295402" y="1151951"/>
+            <a:ext cx="9601196" cy="441719"/>
           </a:xfrm>
         </p:spPr>
         <p:txBody>
           <a:bodyPr>
-            <a:normAutofit/>
+            <a:noAutofit/>
           </a:bodyPr>
           <a:lstStyle/>
           <a:p>
             <a:r>
-              <a:rPr lang="en-US" sz="3000" dirty="0" smtClean="0"/>
-              <a:t>Email Notifications</a:t>
-            </a:r>
-            <a:endParaRPr lang="en-US" sz="3000" dirty="0"/>
-          </a:p>
-        </p:txBody>
-      </p:sp>
-      <p:pic>
-        <p:nvPicPr>
-          <p:cNvPr id="4" name="Content Placeholder 7"/>
-          <p:cNvPicPr>
-            <a:picLocks noGrp="1" noChangeAspect="1"/>
-          </p:cNvPicPr>
-          <p:nvPr>
-            <p:ph idx="1"/>
-          </p:nvPr>
-        </p:nvPicPr>
-        <p:blipFill>
-          <a:blip r:embed="rId2">
-            <a:extLst>
-              <a:ext uri="{28A0092B-C50C-407E-A947-70E740481C1C}">
-                <a14:useLocalDpi xmlns:a14="http://schemas.microsoft.com/office/drawing/2010/main" val="0"/>
-              </a:ext>
-            </a:extLst>
-          </a:blip>
-          <a:stretch>
-            <a:fillRect/>
-          </a:stretch>
-        </p:blipFill>
-        <p:spPr>
-          <a:xfrm>
-            <a:off x="1111208" y="1601788"/>
-            <a:ext cx="9961380" cy="4227512"/>
-          </a:xfrm>
-        </p:spPr>
-      </p:pic>
+              <a:rPr lang="en-US" sz="4000" dirty="0" smtClean="0"/>
+              <a:t>Prometheus and </a:t>
+            </a:r>
+            <a:r>
+              <a:rPr lang="en-US" sz="4000" dirty="0" err="1" smtClean="0"/>
+              <a:t>Grafana</a:t>
+            </a:r>
+            <a:endParaRPr lang="en-US" sz="4000" dirty="0"/>
+          </a:p>
+        </p:txBody>
+      </p:sp>
+      <p:cxnSp>
+        <p:nvCxnSpPr>
+          <p:cNvPr id="28" name="Straight Arrow Connector 27"/>
+          <p:cNvCxnSpPr>
+            <a:stCxn id="7" idx="3"/>
+          </p:cNvCxnSpPr>
+          <p:nvPr/>
+        </p:nvCxnSpPr>
+        <p:spPr>
+          <a:xfrm>
+            <a:off x="9915447" y="3420743"/>
+            <a:ext cx="1134364" cy="0"/>
+          </a:xfrm>
+          <a:prstGeom prst="straightConnector1">
+            <a:avLst/>
+          </a:prstGeom>
+          <a:ln>
+            <a:tailEnd type="triangle"/>
+          </a:ln>
+        </p:spPr>
+        <p:style>
+          <a:lnRef idx="1">
+            <a:schemeClr val="accent1"/>
+          </a:lnRef>
+          <a:fillRef idx="0">
+            <a:schemeClr val="accent1"/>
+          </a:fillRef>
+          <a:effectRef idx="0">
+            <a:schemeClr val="accent1"/>
+          </a:effectRef>
+          <a:fontRef idx="minor">
+            <a:schemeClr val="tx1"/>
+          </a:fontRef>
+        </p:style>
+      </p:cxnSp>
+      <p:grpSp>
+        <p:nvGrpSpPr>
+          <p:cNvPr id="51" name="Group 50"/>
+          <p:cNvGrpSpPr/>
+          <p:nvPr/>
+        </p:nvGrpSpPr>
+        <p:grpSpPr>
+          <a:xfrm>
+            <a:off x="1055226" y="3018836"/>
+            <a:ext cx="10163912" cy="823304"/>
+            <a:chOff x="1107478" y="3007685"/>
+            <a:chExt cx="10163912" cy="823304"/>
+          </a:xfrm>
+        </p:grpSpPr>
+        <p:grpSp>
+          <p:nvGrpSpPr>
+            <p:cNvPr id="50" name="Group 49"/>
+            <p:cNvGrpSpPr/>
+            <p:nvPr/>
+          </p:nvGrpSpPr>
+          <p:grpSpPr>
+            <a:xfrm>
+              <a:off x="1107478" y="3007685"/>
+              <a:ext cx="9760501" cy="823304"/>
+              <a:chOff x="1107478" y="3007685"/>
+              <a:chExt cx="9760501" cy="823304"/>
+            </a:xfrm>
+          </p:grpSpPr>
+          <p:cxnSp>
+            <p:nvCxnSpPr>
+              <p:cNvPr id="11" name="Straight Arrow Connector 10"/>
+              <p:cNvCxnSpPr>
+                <a:stCxn id="5" idx="3"/>
+                <a:endCxn id="6" idx="1"/>
+              </p:cNvCxnSpPr>
+              <p:nvPr/>
+            </p:nvCxnSpPr>
+            <p:spPr>
+              <a:xfrm flipV="1">
+                <a:off x="4986250" y="3409592"/>
+                <a:ext cx="1134364" cy="1"/>
+              </a:xfrm>
+              <a:prstGeom prst="straightConnector1">
+                <a:avLst/>
+              </a:prstGeom>
+              <a:ln>
+                <a:tailEnd type="triangle"/>
+              </a:ln>
+            </p:spPr>
+            <p:style>
+              <a:lnRef idx="1">
+                <a:schemeClr val="accent1"/>
+              </a:lnRef>
+              <a:fillRef idx="0">
+                <a:schemeClr val="accent1"/>
+              </a:fillRef>
+              <a:effectRef idx="0">
+                <a:schemeClr val="accent1"/>
+              </a:effectRef>
+              <a:fontRef idx="minor">
+                <a:schemeClr val="tx1"/>
+              </a:fontRef>
+            </p:style>
+          </p:cxnSp>
+          <p:sp>
+            <p:nvSpPr>
+              <p:cNvPr id="4" name="Rectangle 3"/>
+              <p:cNvSpPr/>
+              <p:nvPr/>
+            </p:nvSpPr>
+            <p:spPr>
+              <a:xfrm>
+                <a:off x="1107478" y="3180993"/>
+                <a:ext cx="1214846" cy="457200"/>
+              </a:xfrm>
+              <a:prstGeom prst="rect">
+                <a:avLst/>
+              </a:prstGeom>
+            </p:spPr>
+            <p:style>
+              <a:lnRef idx="0">
+                <a:schemeClr val="accent1"/>
+              </a:lnRef>
+              <a:fillRef idx="3">
+                <a:schemeClr val="accent1"/>
+              </a:fillRef>
+              <a:effectRef idx="3">
+                <a:schemeClr val="accent1"/>
+              </a:effectRef>
+              <a:fontRef idx="minor">
+                <a:schemeClr val="lt1"/>
+              </a:fontRef>
+            </p:style>
+            <p:txBody>
+              <a:bodyPr rtlCol="0" anchor="ctr"/>
+              <a:lstStyle/>
+              <a:p>
+                <a:pPr algn="ctr"/>
+                <a:r>
+                  <a:rPr lang="en-US" sz="2000" b="1" dirty="0" smtClean="0"/>
+                  <a:t>Airflow</a:t>
+                </a:r>
+                <a:endParaRPr lang="en-US" sz="2000" b="1" dirty="0"/>
+              </a:p>
+            </p:txBody>
+          </p:sp>
+          <p:sp>
+            <p:nvSpPr>
+              <p:cNvPr id="5" name="Rectangle 4"/>
+              <p:cNvSpPr/>
+              <p:nvPr/>
+            </p:nvSpPr>
+            <p:spPr>
+              <a:xfrm>
+                <a:off x="3771404" y="3120226"/>
+                <a:ext cx="1214846" cy="578733"/>
+              </a:xfrm>
+              <a:prstGeom prst="rect">
+                <a:avLst/>
+              </a:prstGeom>
+            </p:spPr>
+            <p:style>
+              <a:lnRef idx="0">
+                <a:schemeClr val="accent1"/>
+              </a:lnRef>
+              <a:fillRef idx="3">
+                <a:schemeClr val="accent1"/>
+              </a:fillRef>
+              <a:effectRef idx="3">
+                <a:schemeClr val="accent1"/>
+              </a:effectRef>
+              <a:fontRef idx="minor">
+                <a:schemeClr val="lt1"/>
+              </a:fontRef>
+            </p:style>
+            <p:txBody>
+              <a:bodyPr rtlCol="0" anchor="ctr"/>
+              <a:lstStyle/>
+              <a:p>
+                <a:pPr algn="ctr"/>
+                <a:r>
+                  <a:rPr lang="en-US" sz="2000" b="1" dirty="0" err="1" smtClean="0"/>
+                  <a:t>StatsD</a:t>
+                </a:r>
+                <a:endParaRPr lang="en-US" sz="2000" b="1" dirty="0" smtClean="0"/>
+              </a:p>
+              <a:p>
+                <a:pPr algn="ctr"/>
+                <a:r>
+                  <a:rPr lang="en-US" sz="2000" b="1" dirty="0" smtClean="0"/>
+                  <a:t>Exporter</a:t>
+                </a:r>
+                <a:endParaRPr lang="en-US" b="1" dirty="0"/>
+              </a:p>
+            </p:txBody>
+          </p:sp>
+          <p:sp>
+            <p:nvSpPr>
+              <p:cNvPr id="6" name="Rectangle 5"/>
+              <p:cNvSpPr/>
+              <p:nvPr/>
+            </p:nvSpPr>
+            <p:spPr>
+              <a:xfrm>
+                <a:off x="6120614" y="3180992"/>
+                <a:ext cx="1497875" cy="457200"/>
+              </a:xfrm>
+              <a:prstGeom prst="rect">
+                <a:avLst/>
+              </a:prstGeom>
+            </p:spPr>
+            <p:style>
+              <a:lnRef idx="0">
+                <a:schemeClr val="accent1"/>
+              </a:lnRef>
+              <a:fillRef idx="3">
+                <a:schemeClr val="accent1"/>
+              </a:fillRef>
+              <a:effectRef idx="3">
+                <a:schemeClr val="accent1"/>
+              </a:effectRef>
+              <a:fontRef idx="minor">
+                <a:schemeClr val="lt1"/>
+              </a:fontRef>
+            </p:style>
+            <p:txBody>
+              <a:bodyPr rtlCol="0" anchor="ctr"/>
+              <a:lstStyle/>
+              <a:p>
+                <a:pPr algn="ctr"/>
+                <a:r>
+                  <a:rPr lang="en-US" sz="2000" b="1" dirty="0"/>
+                  <a:t>Prometheus</a:t>
+                </a:r>
+                <a:endParaRPr lang="en-US" b="1" dirty="0"/>
+              </a:p>
+            </p:txBody>
+          </p:sp>
+          <p:sp>
+            <p:nvSpPr>
+              <p:cNvPr id="7" name="Rectangle 6"/>
+              <p:cNvSpPr/>
+              <p:nvPr/>
+            </p:nvSpPr>
+            <p:spPr>
+              <a:xfrm>
+                <a:off x="8752853" y="3180992"/>
+                <a:ext cx="1214846" cy="457200"/>
+              </a:xfrm>
+              <a:prstGeom prst="rect">
+                <a:avLst/>
+              </a:prstGeom>
+            </p:spPr>
+            <p:style>
+              <a:lnRef idx="0">
+                <a:schemeClr val="accent1"/>
+              </a:lnRef>
+              <a:fillRef idx="3">
+                <a:schemeClr val="accent1"/>
+              </a:fillRef>
+              <a:effectRef idx="3">
+                <a:schemeClr val="accent1"/>
+              </a:effectRef>
+              <a:fontRef idx="minor">
+                <a:schemeClr val="lt1"/>
+              </a:fontRef>
+            </p:style>
+            <p:txBody>
+              <a:bodyPr rtlCol="0" anchor="ctr"/>
+              <a:lstStyle/>
+              <a:p>
+                <a:pPr algn="ctr"/>
+                <a:r>
+                  <a:rPr lang="en-US" sz="2000" b="1" dirty="0" err="1"/>
+                  <a:t>Grafana</a:t>
+                </a:r>
+                <a:endParaRPr lang="en-US" b="1" dirty="0"/>
+              </a:p>
+            </p:txBody>
+          </p:sp>
+          <p:cxnSp>
+            <p:nvCxnSpPr>
+              <p:cNvPr id="9" name="Straight Arrow Connector 8"/>
+              <p:cNvCxnSpPr>
+                <a:stCxn id="4" idx="3"/>
+                <a:endCxn id="5" idx="1"/>
+              </p:cNvCxnSpPr>
+              <p:nvPr/>
+            </p:nvCxnSpPr>
+            <p:spPr>
+              <a:xfrm>
+                <a:off x="2322324" y="3409593"/>
+                <a:ext cx="1449080" cy="0"/>
+              </a:xfrm>
+              <a:prstGeom prst="straightConnector1">
+                <a:avLst/>
+              </a:prstGeom>
+              <a:ln>
+                <a:tailEnd type="triangle"/>
+              </a:ln>
+            </p:spPr>
+            <p:style>
+              <a:lnRef idx="1">
+                <a:schemeClr val="accent1"/>
+              </a:lnRef>
+              <a:fillRef idx="0">
+                <a:schemeClr val="accent1"/>
+              </a:fillRef>
+              <a:effectRef idx="0">
+                <a:schemeClr val="accent1"/>
+              </a:effectRef>
+              <a:fontRef idx="minor">
+                <a:schemeClr val="tx1"/>
+              </a:fontRef>
+            </p:style>
+          </p:cxnSp>
+          <p:cxnSp>
+            <p:nvCxnSpPr>
+              <p:cNvPr id="12" name="Straight Arrow Connector 11"/>
+              <p:cNvCxnSpPr>
+                <a:stCxn id="6" idx="3"/>
+                <a:endCxn id="7" idx="1"/>
+              </p:cNvCxnSpPr>
+              <p:nvPr/>
+            </p:nvCxnSpPr>
+            <p:spPr>
+              <a:xfrm>
+                <a:off x="7618489" y="3409592"/>
+                <a:ext cx="1134364" cy="0"/>
+              </a:xfrm>
+              <a:prstGeom prst="straightConnector1">
+                <a:avLst/>
+              </a:prstGeom>
+              <a:ln>
+                <a:tailEnd type="triangle"/>
+              </a:ln>
+            </p:spPr>
+            <p:style>
+              <a:lnRef idx="1">
+                <a:schemeClr val="accent1"/>
+              </a:lnRef>
+              <a:fillRef idx="0">
+                <a:schemeClr val="accent1"/>
+              </a:fillRef>
+              <a:effectRef idx="0">
+                <a:schemeClr val="accent1"/>
+              </a:effectRef>
+              <a:fontRef idx="minor">
+                <a:schemeClr val="tx1"/>
+              </a:fontRef>
+            </p:style>
+          </p:cxnSp>
+          <p:sp>
+            <p:nvSpPr>
+              <p:cNvPr id="16" name="Rectangle 15"/>
+              <p:cNvSpPr/>
+              <p:nvPr/>
+            </p:nvSpPr>
+            <p:spPr>
+              <a:xfrm>
+                <a:off x="2637040" y="3009482"/>
+                <a:ext cx="691340" cy="400110"/>
+              </a:xfrm>
+              <a:prstGeom prst="rect">
+                <a:avLst/>
+              </a:prstGeom>
+              <a:noFill/>
+            </p:spPr>
+            <p:txBody>
+              <a:bodyPr wrap="square" lIns="91440" tIns="45720" rIns="91440" bIns="45720">
+                <a:spAutoFit/>
+              </a:bodyPr>
+              <a:lstStyle/>
+              <a:p>
+                <a:r>
+                  <a:rPr lang="en-US" sz="2000" dirty="0"/>
+                  <a:t>9125</a:t>
+                </a:r>
+              </a:p>
+            </p:txBody>
+          </p:sp>
+          <p:sp>
+            <p:nvSpPr>
+              <p:cNvPr id="17" name="Rectangle 16"/>
+              <p:cNvSpPr/>
+              <p:nvPr/>
+            </p:nvSpPr>
+            <p:spPr>
+              <a:xfrm>
+                <a:off x="5220484" y="3009482"/>
+                <a:ext cx="691340" cy="400110"/>
+              </a:xfrm>
+              <a:prstGeom prst="rect">
+                <a:avLst/>
+              </a:prstGeom>
+              <a:noFill/>
+            </p:spPr>
+            <p:txBody>
+              <a:bodyPr wrap="square" lIns="91440" tIns="45720" rIns="91440" bIns="45720">
+                <a:spAutoFit/>
+              </a:bodyPr>
+              <a:lstStyle/>
+              <a:p>
+                <a:r>
+                  <a:rPr lang="en-US" sz="2000" dirty="0" smtClean="0"/>
+                  <a:t>9102</a:t>
+                </a:r>
+                <a:endParaRPr lang="en-US" sz="2000" dirty="0"/>
+              </a:p>
+            </p:txBody>
+          </p:sp>
+          <p:sp>
+            <p:nvSpPr>
+              <p:cNvPr id="18" name="Rectangle 17"/>
+              <p:cNvSpPr/>
+              <p:nvPr/>
+            </p:nvSpPr>
+            <p:spPr>
+              <a:xfrm>
+                <a:off x="7860647" y="3028512"/>
+                <a:ext cx="691340" cy="400110"/>
+              </a:xfrm>
+              <a:prstGeom prst="rect">
+                <a:avLst/>
+              </a:prstGeom>
+              <a:noFill/>
+            </p:spPr>
+            <p:txBody>
+              <a:bodyPr wrap="square" lIns="91440" tIns="45720" rIns="91440" bIns="45720">
+                <a:spAutoFit/>
+              </a:bodyPr>
+              <a:lstStyle/>
+              <a:p>
+                <a:r>
+                  <a:rPr lang="en-US" sz="2000" dirty="0" smtClean="0"/>
+                  <a:t>9090</a:t>
+                </a:r>
+                <a:endParaRPr lang="en-US" sz="2000" dirty="0"/>
+              </a:p>
+            </p:txBody>
+          </p:sp>
+          <p:sp>
+            <p:nvSpPr>
+              <p:cNvPr id="20" name="Rectangle 19"/>
+              <p:cNvSpPr/>
+              <p:nvPr/>
+            </p:nvSpPr>
+            <p:spPr>
+              <a:xfrm>
+                <a:off x="10176639" y="3007685"/>
+                <a:ext cx="691340" cy="400110"/>
+              </a:xfrm>
+              <a:prstGeom prst="rect">
+                <a:avLst/>
+              </a:prstGeom>
+              <a:noFill/>
+            </p:spPr>
+            <p:txBody>
+              <a:bodyPr wrap="square" lIns="91440" tIns="45720" rIns="91440" bIns="45720">
+                <a:spAutoFit/>
+              </a:bodyPr>
+              <a:lstStyle/>
+              <a:p>
+                <a:r>
+                  <a:rPr lang="en-US" sz="2000" dirty="0" smtClean="0"/>
+                  <a:t>3100</a:t>
+                </a:r>
+                <a:endParaRPr lang="en-US" sz="2000" dirty="0"/>
+              </a:p>
+            </p:txBody>
+          </p:sp>
+          <p:sp>
+            <p:nvSpPr>
+              <p:cNvPr id="46" name="TextBox 45"/>
+              <p:cNvSpPr txBox="1"/>
+              <p:nvPr/>
+            </p:nvSpPr>
+            <p:spPr>
+              <a:xfrm>
+                <a:off x="2658397" y="3428622"/>
+                <a:ext cx="737959" cy="369332"/>
+              </a:xfrm>
+              <a:prstGeom prst="rect">
+                <a:avLst/>
+              </a:prstGeom>
+              <a:noFill/>
+            </p:spPr>
+            <p:txBody>
+              <a:bodyPr wrap="none" rtlCol="0">
+                <a:spAutoFit/>
+              </a:bodyPr>
+              <a:lstStyle/>
+              <a:p>
+                <a:r>
+                  <a:rPr lang="en-US" dirty="0" smtClean="0"/>
+                  <a:t>Ingest</a:t>
+                </a:r>
+                <a:endParaRPr lang="en-US" dirty="0"/>
+              </a:p>
+            </p:txBody>
+          </p:sp>
+          <p:sp>
+            <p:nvSpPr>
+              <p:cNvPr id="47" name="TextBox 46"/>
+              <p:cNvSpPr txBox="1"/>
+              <p:nvPr/>
+            </p:nvSpPr>
+            <p:spPr>
+              <a:xfrm>
+                <a:off x="5165344" y="3461657"/>
+                <a:ext cx="776175" cy="369332"/>
+              </a:xfrm>
+              <a:prstGeom prst="rect">
+                <a:avLst/>
+              </a:prstGeom>
+              <a:noFill/>
+            </p:spPr>
+            <p:txBody>
+              <a:bodyPr wrap="none" rtlCol="0">
+                <a:spAutoFit/>
+              </a:bodyPr>
+              <a:lstStyle/>
+              <a:p>
+                <a:r>
+                  <a:rPr lang="en-US" dirty="0" smtClean="0"/>
+                  <a:t>Scrape</a:t>
+                </a:r>
+                <a:endParaRPr lang="en-US" dirty="0"/>
+              </a:p>
+            </p:txBody>
+          </p:sp>
+          <p:sp>
+            <p:nvSpPr>
+              <p:cNvPr id="48" name="TextBox 47"/>
+              <p:cNvSpPr txBox="1"/>
+              <p:nvPr/>
+            </p:nvSpPr>
+            <p:spPr>
+              <a:xfrm>
+                <a:off x="7783806" y="3435531"/>
+                <a:ext cx="795411" cy="369332"/>
+              </a:xfrm>
+              <a:prstGeom prst="rect">
+                <a:avLst/>
+              </a:prstGeom>
+              <a:noFill/>
+            </p:spPr>
+            <p:txBody>
+              <a:bodyPr wrap="none" rtlCol="0">
+                <a:spAutoFit/>
+              </a:bodyPr>
+              <a:lstStyle/>
+              <a:p>
+                <a:r>
+                  <a:rPr lang="en-US" dirty="0" smtClean="0"/>
+                  <a:t>Source</a:t>
+                </a:r>
+                <a:endParaRPr lang="en-US" dirty="0"/>
+              </a:p>
+            </p:txBody>
+          </p:sp>
+        </p:grpSp>
+        <p:sp>
+          <p:nvSpPr>
+            <p:cNvPr id="49" name="TextBox 48"/>
+            <p:cNvSpPr txBox="1"/>
+            <p:nvPr/>
+          </p:nvSpPr>
+          <p:spPr>
+            <a:xfrm>
+              <a:off x="10091259" y="3439103"/>
+              <a:ext cx="1180131" cy="369332"/>
+            </a:xfrm>
+            <a:prstGeom prst="rect">
+              <a:avLst/>
+            </a:prstGeom>
+            <a:noFill/>
+          </p:spPr>
+          <p:txBody>
+            <a:bodyPr wrap="none" rtlCol="0">
+              <a:spAutoFit/>
+            </a:bodyPr>
+            <a:lstStyle/>
+            <a:p>
+              <a:r>
+                <a:rPr lang="en-US" dirty="0" smtClean="0"/>
+                <a:t>Dashboard</a:t>
+              </a:r>
+              <a:endParaRPr lang="en-US" dirty="0"/>
+            </a:p>
+          </p:txBody>
+        </p:sp>
+      </p:grpSp>
     </p:spTree>
     <p:extLst>
       <p:ext uri="{BB962C8B-B14F-4D97-AF65-F5344CB8AC3E}">
-        <p14:creationId xmlns:p14="http://schemas.microsoft.com/office/powerpoint/2010/main" val="1887938766"/>
+        <p14:creationId xmlns:p14="http://schemas.microsoft.com/office/powerpoint/2010/main" val="473219696"/>
       </p:ext>
     </p:extLst>
   </p:cSld>
   <p:clrMapOvr>
     <a:masterClrMapping/>
   </p:clrMapOvr>
-  <p:timing>
-    <p:tnLst>
-      <p:par>
-        <p:cTn id="1" dur="indefinite" restart="never" nodeType="tmRoot"/>
-      </p:par>
-    </p:tnLst>
-  </p:timing>
 </p:sld>
 </file>
 
@@ -7921,7 +8726,7 @@
         </p:nvSpPr>
         <p:spPr>
           <a:xfrm>
-            <a:off x="1284531" y="449868"/>
+            <a:off x="1240811" y="449870"/>
             <a:ext cx="9601196" cy="1303867"/>
           </a:xfrm>
         </p:spPr>
@@ -7933,7 +8738,7 @@
           <a:p>
             <a:r>
               <a:rPr lang="en-US" sz="3000" dirty="0" smtClean="0"/>
-              <a:t>Report Attachment (Email)</a:t>
+              <a:t>Email Notifications</a:t>
             </a:r>
             <a:endParaRPr lang="en-US" sz="3000" dirty="0"/>
           </a:p>
@@ -7941,7 +8746,7 @@
       </p:sp>
       <p:pic>
         <p:nvPicPr>
-          <p:cNvPr id="4" name="Content Placeholder 3"/>
+          <p:cNvPr id="4" name="Content Placeholder 7"/>
           <p:cNvPicPr>
             <a:picLocks noGrp="1" noChangeAspect="1"/>
           </p:cNvPicPr>
@@ -7949,7 +8754,7 @@
             <p:ph idx="1"/>
           </p:nvPr>
         </p:nvPicPr>
-        <p:blipFill rotWithShape="1">
+        <p:blipFill>
           <a:blip r:embed="rId2">
             <a:extLst>
               <a:ext uri="{28A0092B-C50C-407E-A947-70E740481C1C}">
@@ -7957,20 +8762,21 @@
               </a:ext>
             </a:extLst>
           </a:blip>
-          <a:srcRect l="705" t="2429" r="1199" b="1"/>
-          <a:stretch/>
+          <a:stretch>
+            <a:fillRect/>
+          </a:stretch>
         </p:blipFill>
         <p:spPr>
           <a:xfrm>
-            <a:off x="838199" y="1639887"/>
-            <a:ext cx="10493860" cy="4559987"/>
+            <a:off x="1111208" y="1601788"/>
+            <a:ext cx="9961380" cy="4227512"/>
           </a:xfrm>
         </p:spPr>
       </p:pic>
     </p:spTree>
     <p:extLst>
       <p:ext uri="{BB962C8B-B14F-4D97-AF65-F5344CB8AC3E}">
-        <p14:creationId xmlns:p14="http://schemas.microsoft.com/office/powerpoint/2010/main" val="2806538065"/>
+        <p14:creationId xmlns:p14="http://schemas.microsoft.com/office/powerpoint/2010/main" val="1887938766"/>
       </p:ext>
     </p:extLst>
   </p:cSld>
@@ -8004,166 +8810,68 @@
           <a:chExt cx="0" cy="0"/>
         </a:xfrm>
       </p:grpSpPr>
+      <p:sp>
+        <p:nvSpPr>
+          <p:cNvPr id="2" name="Title 1"/>
+          <p:cNvSpPr>
+            <a:spLocks noGrp="1"/>
+          </p:cNvSpPr>
+          <p:nvPr>
+            <p:ph type="title"/>
+          </p:nvPr>
+        </p:nvSpPr>
+        <p:spPr>
+          <a:xfrm>
+            <a:off x="1284531" y="449868"/>
+            <a:ext cx="9601196" cy="1303867"/>
+          </a:xfrm>
+        </p:spPr>
+        <p:txBody>
+          <a:bodyPr>
+            <a:normAutofit/>
+          </a:bodyPr>
+          <a:lstStyle/>
+          <a:p>
+            <a:r>
+              <a:rPr lang="en-US" sz="3000" dirty="0" smtClean="0"/>
+              <a:t>Report Attachment (Email)</a:t>
+            </a:r>
+            <a:endParaRPr lang="en-US" sz="3000" dirty="0"/>
+          </a:p>
+        </p:txBody>
+      </p:sp>
       <p:pic>
         <p:nvPicPr>
-          <p:cNvPr id="8" name="Picture 7"/>
+          <p:cNvPr id="4" name="Content Placeholder 3"/>
           <p:cNvPicPr>
-            <a:picLocks noChangeAspect="1"/>
+            <a:picLocks noGrp="1" noChangeAspect="1"/>
           </p:cNvPicPr>
-          <p:nvPr/>
+          <p:nvPr>
+            <p:ph idx="1"/>
+          </p:nvPr>
         </p:nvPicPr>
-        <p:blipFill>
-          <a:blip r:embed="rId2" cstate="print">
+        <p:blipFill rotWithShape="1">
+          <a:blip r:embed="rId2">
             <a:extLst>
               <a:ext uri="{28A0092B-C50C-407E-A947-70E740481C1C}">
                 <a14:useLocalDpi xmlns:a14="http://schemas.microsoft.com/office/drawing/2010/main" val="0"/>
               </a:ext>
             </a:extLst>
           </a:blip>
-          <a:stretch>
-            <a:fillRect/>
-          </a:stretch>
+          <a:srcRect l="705" t="2429" r="1199" b="1"/>
+          <a:stretch/>
         </p:blipFill>
         <p:spPr>
           <a:xfrm>
-            <a:off x="5651500" y="660401"/>
-            <a:ext cx="2614612" cy="5537200"/>
-          </a:xfrm>
-          <a:prstGeom prst="rect">
-            <a:avLst/>
-          </a:prstGeom>
-        </p:spPr>
-        <p:style>
-          <a:lnRef idx="2">
-            <a:schemeClr val="dk1"/>
-          </a:lnRef>
-          <a:fillRef idx="1">
-            <a:schemeClr val="lt1"/>
-          </a:fillRef>
-          <a:effectRef idx="0">
-            <a:schemeClr val="dk1"/>
-          </a:effectRef>
-          <a:fontRef idx="minor">
-            <a:schemeClr val="dk1"/>
-          </a:fontRef>
-        </p:style>
+            <a:off x="838199" y="1639887"/>
+            <a:ext cx="10493860" cy="4559987"/>
+          </a:xfrm>
+        </p:spPr>
       </p:pic>
-      <p:pic>
-        <p:nvPicPr>
-          <p:cNvPr id="9" name="Picture 8"/>
-          <p:cNvPicPr>
-            <a:picLocks noChangeAspect="1"/>
-          </p:cNvPicPr>
-          <p:nvPr/>
-        </p:nvPicPr>
-        <p:blipFill>
-          <a:blip r:embed="rId3" cstate="print">
-            <a:extLst>
-              <a:ext uri="{28A0092B-C50C-407E-A947-70E740481C1C}">
-                <a14:useLocalDpi xmlns:a14="http://schemas.microsoft.com/office/drawing/2010/main" val="0"/>
-              </a:ext>
-            </a:extLst>
-          </a:blip>
-          <a:stretch>
-            <a:fillRect/>
-          </a:stretch>
-        </p:blipFill>
-        <p:spPr>
-          <a:xfrm>
-            <a:off x="8313736" y="648586"/>
-            <a:ext cx="2613600" cy="5549014"/>
-          </a:xfrm>
-          <a:prstGeom prst="rect">
-            <a:avLst/>
-          </a:prstGeom>
-        </p:spPr>
-        <p:style>
-          <a:lnRef idx="2">
-            <a:schemeClr val="dk1"/>
-          </a:lnRef>
-          <a:fillRef idx="1">
-            <a:schemeClr val="lt1"/>
-          </a:fillRef>
-          <a:effectRef idx="0">
-            <a:schemeClr val="dk1"/>
-          </a:effectRef>
-          <a:fontRef idx="minor">
-            <a:schemeClr val="dk1"/>
-          </a:fontRef>
-        </p:style>
-      </p:pic>
-      <p:sp>
-        <p:nvSpPr>
-          <p:cNvPr id="11" name="TextBox 10"/>
-          <p:cNvSpPr txBox="1"/>
-          <p:nvPr/>
-        </p:nvSpPr>
-        <p:spPr>
-          <a:xfrm>
-            <a:off x="1296539" y="1378422"/>
-            <a:ext cx="3111688" cy="1015663"/>
-          </a:xfrm>
-          <a:prstGeom prst="rect">
-            <a:avLst/>
-          </a:prstGeom>
-          <a:noFill/>
-        </p:spPr>
-        <p:txBody>
-          <a:bodyPr wrap="square" rtlCol="0">
-            <a:spAutoFit/>
-          </a:bodyPr>
-          <a:lstStyle/>
-          <a:p>
-            <a:r>
-              <a:rPr lang="en-US" sz="3000" dirty="0" smtClean="0">
-                <a:latin typeface="+mj-lt"/>
-              </a:rPr>
-              <a:t>Telegram and Slack Notifications</a:t>
-            </a:r>
-            <a:endParaRPr lang="en-US" sz="3000" dirty="0">
-              <a:latin typeface="+mj-lt"/>
-            </a:endParaRPr>
-          </a:p>
-        </p:txBody>
-      </p:sp>
-      <p:sp>
-        <p:nvSpPr>
-          <p:cNvPr id="12" name="TextBox 11"/>
-          <p:cNvSpPr txBox="1"/>
-          <p:nvPr/>
-        </p:nvSpPr>
-        <p:spPr>
-          <a:xfrm>
-            <a:off x="1296539" y="2538483"/>
-            <a:ext cx="4039736" cy="1015663"/>
-          </a:xfrm>
-          <a:prstGeom prst="rect">
-            <a:avLst/>
-          </a:prstGeom>
-          <a:noFill/>
-        </p:spPr>
-        <p:txBody>
-          <a:bodyPr wrap="square" rtlCol="0">
-            <a:spAutoFit/>
-          </a:bodyPr>
-          <a:lstStyle/>
-          <a:p>
-            <a:r>
-              <a:rPr lang="en-US" sz="2000" dirty="0"/>
-              <a:t>a</a:t>
-            </a:r>
-            <a:r>
-              <a:rPr lang="en-US" sz="2000" dirty="0" smtClean="0"/>
-              <a:t>ll statuses on the airflow task instance are success, retry, failure. Also sent to Telegram and Slack.</a:t>
-            </a:r>
-            <a:endParaRPr lang="en-US" sz="2000" dirty="0"/>
-          </a:p>
-        </p:txBody>
-      </p:sp>
     </p:spTree>
     <p:extLst>
       <p:ext uri="{BB962C8B-B14F-4D97-AF65-F5344CB8AC3E}">
-        <p14:creationId xmlns:p14="http://schemas.microsoft.com/office/powerpoint/2010/main" val="672279880"/>
+        <p14:creationId xmlns:p14="http://schemas.microsoft.com/office/powerpoint/2010/main" val="2806538065"/>
       </p:ext>
     </p:extLst>
   </p:cSld>

</xml_diff>